<commit_message>
update final project background and technical data preprocessing
</commit_message>
<xml_diff>
--- a/0-Final-Project-Overview.pptx
+++ b/0-Final-Project-Overview.pptx
@@ -2837,7 +2837,7 @@
       </dgm:t>
     </dgm:pt>
     <dgm:pt modelId="{ED8A4D5A-218A-4FB0-A06E-375793C27C62}">
-      <dgm:prSet phldrT="[Text]"/>
+      <dgm:prSet phldrT="[Text]" custT="1"/>
       <dgm:spPr>
         <a:solidFill>
           <a:srgbClr val="D6D4D7"/>
@@ -2848,14 +2848,14 @@
         <a:lstStyle/>
         <a:p>
           <a:r>
-            <a:rPr lang="en-ID" dirty="0" err="1">
+            <a:rPr lang="en-ID" sz="2000" dirty="0" err="1">
               <a:solidFill>
                 <a:srgbClr val="50698F"/>
               </a:solidFill>
             </a:rPr>
-            <a:t>Github</a:t>
+            <a:t>Rizalespe</a:t>
           </a:r>
-          <a:endParaRPr lang="en-ID" dirty="0">
+          <a:endParaRPr lang="en-ID" sz="2000" dirty="0">
             <a:solidFill>
               <a:srgbClr val="50698F"/>
             </a:solidFill>
@@ -2886,7 +2886,7 @@
       </dgm:t>
     </dgm:pt>
     <dgm:pt modelId="{0691221E-BAAF-42D8-816E-AB49F1C97DD5}">
-      <dgm:prSet phldrT="[Text]"/>
+      <dgm:prSet phldrT="[Text]" custT="1"/>
       <dgm:spPr>
         <a:solidFill>
           <a:srgbClr val="D6D4D7"/>
@@ -2897,14 +2897,14 @@
         <a:lstStyle/>
         <a:p>
           <a:r>
-            <a:rPr lang="en-ID" dirty="0" err="1">
+            <a:rPr lang="en-ID" sz="2000" dirty="0" err="1">
               <a:solidFill>
                 <a:srgbClr val="50698F"/>
               </a:solidFill>
             </a:rPr>
             <a:t>IndoNLU</a:t>
           </a:r>
-          <a:endParaRPr lang="en-ID" dirty="0">
+          <a:endParaRPr lang="en-ID" sz="2000" dirty="0">
             <a:solidFill>
               <a:srgbClr val="50698F"/>
             </a:solidFill>
@@ -2935,7 +2935,7 @@
       </dgm:t>
     </dgm:pt>
     <dgm:pt modelId="{47D158F5-750F-4B5D-B114-B22CFFC1D2F8}">
-      <dgm:prSet phldrT="[Text]"/>
+      <dgm:prSet phldrT="[Text]" custT="1"/>
       <dgm:spPr>
         <a:solidFill>
           <a:srgbClr val="D6D4D7"/>
@@ -2946,12 +2946,12 @@
         <a:lstStyle/>
         <a:p>
           <a:r>
-            <a:rPr lang="en-ID" dirty="0">
+            <a:rPr lang="en-ID" sz="2000" dirty="0">
               <a:solidFill>
                 <a:srgbClr val="50698F"/>
               </a:solidFill>
             </a:rPr>
-            <a:t>Others</a:t>
+            <a:t>Research Gate</a:t>
           </a:r>
         </a:p>
       </dgm:t>
@@ -3366,36 +3366,12 @@
         <a:p>
           <a:pPr algn="l"/>
           <a:r>
-            <a:rPr lang="en-ID" sz="900" b="1" dirty="0" err="1">
-              <a:solidFill>
-                <a:srgbClr val="003781"/>
-              </a:solidFill>
-            </a:rPr>
-            <a:t>Github</a:t>
-          </a:r>
-          <a:r>
             <a:rPr lang="en-ID" sz="900" b="1" dirty="0">
               <a:solidFill>
                 <a:srgbClr val="003781"/>
               </a:solidFill>
             </a:rPr>
-            <a:t> – </a:t>
-          </a:r>
-          <a:r>
-            <a:rPr lang="en-ID" sz="900" b="1" dirty="0" err="1">
-              <a:solidFill>
-                <a:srgbClr val="003781"/>
-              </a:solidFill>
-            </a:rPr>
-            <a:t>indobenchmark</a:t>
-          </a:r>
-          <a:r>
-            <a:rPr lang="en-ID" sz="900" b="1" dirty="0">
-              <a:solidFill>
-                <a:srgbClr val="003781"/>
-              </a:solidFill>
-            </a:rPr>
-            <a:t> (</a:t>
+            <a:t>(</a:t>
           </a:r>
           <a:r>
             <a:rPr lang="en-ID" sz="900" b="1" dirty="0">
@@ -3422,6 +3398,49 @@
             </a:rPr>
             <a:t> </a:t>
           </a:r>
+        </a:p>
+        <a:p>
+          <a:pPr algn="l"/>
+          <a:r>
+            <a:rPr lang="en-ID" sz="900" dirty="0">
+              <a:solidFill>
+                <a:srgbClr val="003781"/>
+              </a:solidFill>
+            </a:rPr>
+            <a:t>- </a:t>
+          </a:r>
+          <a:r>
+            <a:rPr lang="en-ID" sz="900" dirty="0" err="1">
+              <a:solidFill>
+                <a:srgbClr val="003781"/>
+              </a:solidFill>
+            </a:rPr>
+            <a:t>smsa_doc</a:t>
+          </a:r>
+          <a:r>
+            <a:rPr lang="en-ID" sz="900" dirty="0">
+              <a:solidFill>
+                <a:srgbClr val="003781"/>
+              </a:solidFill>
+            </a:rPr>
+            <a:t>-sentiment-</a:t>
+          </a:r>
+          <a:r>
+            <a:rPr lang="en-ID" sz="900" dirty="0" err="1">
+              <a:solidFill>
+                <a:srgbClr val="003781"/>
+              </a:solidFill>
+            </a:rPr>
+            <a:t>prosa</a:t>
+          </a:r>
+          <a:endParaRPr lang="en-ID" sz="900" dirty="0">
+            <a:solidFill>
+              <a:srgbClr val="003781"/>
+            </a:solidFill>
+          </a:endParaRPr>
+        </a:p>
+        <a:p>
+          <a:pPr algn="l"/>
           <a:endParaRPr lang="en-ID" sz="600" dirty="0"/>
         </a:p>
       </dgm:t>
@@ -3471,10 +3490,65 @@
               <a:solidFill>
                 <a:srgbClr val="003781"/>
               </a:solidFill>
+              <a:hlinkClick xmlns:r="http://schemas.openxmlformats.org/officeDocument/2006/relationships" r:id="rId3"/>
             </a:rPr>
-            <a:t>Meltwater</a:t>
+            <a:t>https://www.researchgate.net/publication/339936724_Indonesian_Sentiment_Twitter_Dataset</a:t>
           </a:r>
-          <a:endParaRPr lang="en-ID" sz="900" dirty="0"/>
+          <a:endParaRPr lang="en-ID" sz="900" b="1" dirty="0">
+            <a:solidFill>
+              <a:srgbClr val="003781"/>
+            </a:solidFill>
+          </a:endParaRPr>
+        </a:p>
+        <a:p>
+          <a:pPr algn="l">
+            <a:buFont typeface="+mj-lt"/>
+            <a:buNone/>
+          </a:pPr>
+          <a:r>
+            <a:rPr lang="en-ID" sz="900" b="0" dirty="0">
+              <a:solidFill>
+                <a:srgbClr val="003781"/>
+              </a:solidFill>
+            </a:rPr>
+            <a:t>- </a:t>
+          </a:r>
+          <a:r>
+            <a:rPr lang="en-ID" sz="900" b="0" dirty="0" err="1">
+              <a:solidFill>
+                <a:srgbClr val="003781"/>
+              </a:solidFill>
+            </a:rPr>
+            <a:t>Indonesian_Sentiment_Twitter_Dataset_Labeled</a:t>
+          </a:r>
+          <a:endParaRPr lang="en-ID" sz="900" b="0" dirty="0">
+            <a:solidFill>
+              <a:srgbClr val="003781"/>
+            </a:solidFill>
+          </a:endParaRPr>
+        </a:p>
+        <a:p>
+          <a:pPr algn="l">
+            <a:buFont typeface="+mj-lt"/>
+            <a:buNone/>
+          </a:pPr>
+          <a:r>
+            <a:rPr lang="en-ID" sz="900" b="0" dirty="0">
+              <a:solidFill>
+                <a:srgbClr val="003781"/>
+              </a:solidFill>
+            </a:rPr>
+            <a:t>- </a:t>
+          </a:r>
+          <a:r>
+            <a:rPr lang="en-ID" sz="900" b="0" dirty="0" err="1">
+              <a:solidFill>
+                <a:srgbClr val="003781"/>
+              </a:solidFill>
+            </a:rPr>
+            <a:t>Indonesian_Sentiment_Twitter_Dataset_Unlabeled</a:t>
+          </a:r>
+          <a:endParaRPr lang="en-ID" sz="900" b="0" dirty="0"/>
         </a:p>
       </dgm:t>
     </dgm:pt>
@@ -3490,6 +3564,113 @@
       </dgm:t>
     </dgm:pt>
     <dgm:pt modelId="{6EC0AFCE-DD60-42F1-A492-EDC486E67FB1}" type="sibTrans" cxnId="{F525529E-17F8-460A-AA35-57C6FDA713DE}">
+      <dgm:prSet/>
+      <dgm:spPr/>
+      <dgm:t>
+        <a:bodyPr/>
+        <a:lstStyle/>
+        <a:p>
+          <a:endParaRPr lang="en-ID"/>
+        </a:p>
+      </dgm:t>
+    </dgm:pt>
+    <dgm:pt modelId="{041B48CF-8F2A-46D6-AB57-1204901271B3}">
+      <dgm:prSet custT="1"/>
+      <dgm:spPr>
+        <a:solidFill>
+          <a:srgbClr val="D6D4D7"/>
+        </a:solidFill>
+      </dgm:spPr>
+      <dgm:t>
+        <a:bodyPr/>
+        <a:lstStyle/>
+        <a:p>
+          <a:r>
+            <a:rPr lang="en-ID" sz="2000" dirty="0">
+              <a:solidFill>
+                <a:srgbClr val="50698F"/>
+              </a:solidFill>
+            </a:rPr>
+            <a:t>Louis Owen</a:t>
+          </a:r>
+          <a:endParaRPr lang="en-ID" sz="2000" dirty="0"/>
+        </a:p>
+      </dgm:t>
+    </dgm:pt>
+    <dgm:pt modelId="{85799810-4233-46E2-ADBF-04E675986D3E}" type="parTrans" cxnId="{E2E6EC3C-E3E7-4B4E-8A2E-4BA7ACAA6D39}">
+      <dgm:prSet/>
+      <dgm:spPr/>
+      <dgm:t>
+        <a:bodyPr/>
+        <a:lstStyle/>
+        <a:p>
+          <a:endParaRPr lang="en-ID"/>
+        </a:p>
+      </dgm:t>
+    </dgm:pt>
+    <dgm:pt modelId="{00C029F7-F372-481E-BCAE-A76AA1A18465}" type="sibTrans" cxnId="{E2E6EC3C-E3E7-4B4E-8A2E-4BA7ACAA6D39}">
+      <dgm:prSet/>
+      <dgm:spPr/>
+      <dgm:t>
+        <a:bodyPr/>
+        <a:lstStyle/>
+        <a:p>
+          <a:endParaRPr lang="en-ID"/>
+        </a:p>
+      </dgm:t>
+    </dgm:pt>
+    <dgm:pt modelId="{F753B001-5355-4F22-ABFB-722AC8443D88}">
+      <dgm:prSet custT="1"/>
+      <dgm:spPr>
+        <a:solidFill>
+          <a:srgbClr val="DAE3F3"/>
+        </a:solidFill>
+      </dgm:spPr>
+      <dgm:t>
+        <a:bodyPr/>
+        <a:lstStyle/>
+        <a:p>
+          <a:pPr algn="l"/>
+          <a:r>
+            <a:rPr lang="en-ID" sz="900" b="1" dirty="0">
+              <a:solidFill>
+                <a:srgbClr val="0563C1"/>
+              </a:solidFill>
+              <a:hlinkClick xmlns:r="http://schemas.openxmlformats.org/officeDocument/2006/relationships" r:id="rId4"/>
+            </a:rPr>
+            <a:t>https://github.com/louisowen6/NLP_bahasa_resources</a:t>
+          </a:r>
+          <a:endParaRPr lang="en-ID" sz="900" b="1" dirty="0">
+            <a:solidFill>
+              <a:srgbClr val="0563C1"/>
+            </a:solidFill>
+          </a:endParaRPr>
+        </a:p>
+        <a:p>
+          <a:pPr algn="l"/>
+          <a:r>
+            <a:rPr lang="en-ID" sz="900" b="0" dirty="0">
+              <a:solidFill>
+                <a:srgbClr val="0563C1"/>
+              </a:solidFill>
+            </a:rPr>
+            <a:t>- Dataset positive &amp; negative words</a:t>
+          </a:r>
+        </a:p>
+      </dgm:t>
+    </dgm:pt>
+    <dgm:pt modelId="{F8B3CB29-D20D-44F6-8295-4F4A99AE09AB}" type="parTrans" cxnId="{B4BBE38C-BFD6-4180-96D5-7DB9E25275B2}">
+      <dgm:prSet/>
+      <dgm:spPr/>
+      <dgm:t>
+        <a:bodyPr/>
+        <a:lstStyle/>
+        <a:p>
+          <a:endParaRPr lang="en-ID"/>
+        </a:p>
+      </dgm:t>
+    </dgm:pt>
+    <dgm:pt modelId="{8B528E7C-B229-418D-A34F-F31B14A93FEB}" type="sibTrans" cxnId="{B4BBE38C-BFD6-4180-96D5-7DB9E25275B2}">
       <dgm:prSet/>
       <dgm:spPr/>
       <dgm:t>
@@ -3517,7 +3698,7 @@
       <dgm:spPr/>
     </dgm:pt>
     <dgm:pt modelId="{35965975-1763-42E8-A0A9-2B7448BC0B63}" type="pres">
-      <dgm:prSet presAssocID="{4781C09F-9D19-4A35-BBE8-F64C47F4824E}" presName="LevelOneTextNode" presStyleLbl="node0" presStyleIdx="0" presStyleCnt="1" custLinFactNeighborX="3921" custLinFactNeighborY="1228">
+      <dgm:prSet presAssocID="{4781C09F-9D19-4A35-BBE8-F64C47F4824E}" presName="LevelOneTextNode" presStyleLbl="node0" presStyleIdx="0" presStyleCnt="1" custLinFactX="-100000" custLinFactNeighborX="-106045" custLinFactNeighborY="3743">
         <dgm:presLayoutVars>
           <dgm:chPref val="3"/>
         </dgm:presLayoutVars>
@@ -3529,11 +3710,11 @@
       <dgm:spPr/>
     </dgm:pt>
     <dgm:pt modelId="{F856F9A6-DB9F-4534-879E-7C1E083BDF37}" type="pres">
-      <dgm:prSet presAssocID="{553EC3AC-C1C9-4BD7-800C-FAA831928C3F}" presName="conn2-1" presStyleLbl="parChTrans1D2" presStyleIdx="0" presStyleCnt="3"/>
+      <dgm:prSet presAssocID="{553EC3AC-C1C9-4BD7-800C-FAA831928C3F}" presName="conn2-1" presStyleLbl="parChTrans1D2" presStyleIdx="0" presStyleCnt="4"/>
       <dgm:spPr/>
     </dgm:pt>
     <dgm:pt modelId="{D4791497-B878-4DD2-9A78-A9BF912BA82F}" type="pres">
-      <dgm:prSet presAssocID="{553EC3AC-C1C9-4BD7-800C-FAA831928C3F}" presName="connTx" presStyleLbl="parChTrans1D2" presStyleIdx="0" presStyleCnt="3"/>
+      <dgm:prSet presAssocID="{553EC3AC-C1C9-4BD7-800C-FAA831928C3F}" presName="connTx" presStyleLbl="parChTrans1D2" presStyleIdx="0" presStyleCnt="4"/>
       <dgm:spPr/>
     </dgm:pt>
     <dgm:pt modelId="{20A90858-A007-439B-A93C-850AB27E46C4}" type="pres">
@@ -3541,7 +3722,7 @@
       <dgm:spPr/>
     </dgm:pt>
     <dgm:pt modelId="{05FEF6E4-5CCC-4B28-8EB1-68270640A142}" type="pres">
-      <dgm:prSet presAssocID="{ED8A4D5A-218A-4FB0-A06E-375793C27C62}" presName="LevelTwoTextNode" presStyleLbl="node2" presStyleIdx="0" presStyleCnt="3" custLinFactNeighborX="1656" custLinFactNeighborY="-13378">
+      <dgm:prSet presAssocID="{ED8A4D5A-218A-4FB0-A06E-375793C27C62}" presName="LevelTwoTextNode" presStyleLbl="node2" presStyleIdx="0" presStyleCnt="4" custScaleX="57641" custLinFactNeighborX="-36665" custLinFactNeighborY="-409">
         <dgm:presLayoutVars>
           <dgm:chPref val="3"/>
         </dgm:presLayoutVars>
@@ -3553,11 +3734,11 @@
       <dgm:spPr/>
     </dgm:pt>
     <dgm:pt modelId="{573F8E7E-A554-4744-8989-B93E10893469}" type="pres">
-      <dgm:prSet presAssocID="{2DB84DC5-1CFE-462B-BB26-37ED1061BCBB}" presName="conn2-1" presStyleLbl="parChTrans1D3" presStyleIdx="0" presStyleCnt="3"/>
+      <dgm:prSet presAssocID="{2DB84DC5-1CFE-462B-BB26-37ED1061BCBB}" presName="conn2-1" presStyleLbl="parChTrans1D3" presStyleIdx="0" presStyleCnt="4"/>
       <dgm:spPr/>
     </dgm:pt>
     <dgm:pt modelId="{2381D428-C84D-4111-9894-0B2F5D048543}" type="pres">
-      <dgm:prSet presAssocID="{2DB84DC5-1CFE-462B-BB26-37ED1061BCBB}" presName="connTx" presStyleLbl="parChTrans1D3" presStyleIdx="0" presStyleCnt="3"/>
+      <dgm:prSet presAssocID="{2DB84DC5-1CFE-462B-BB26-37ED1061BCBB}" presName="connTx" presStyleLbl="parChTrans1D3" presStyleIdx="0" presStyleCnt="4"/>
       <dgm:spPr/>
     </dgm:pt>
     <dgm:pt modelId="{78F6A0C2-7054-45FF-B2D0-4C575CA9D085}" type="pres">
@@ -3565,7 +3746,7 @@
       <dgm:spPr/>
     </dgm:pt>
     <dgm:pt modelId="{C2EAB7C8-65E3-4058-9880-B1310133AB3F}" type="pres">
-      <dgm:prSet presAssocID="{70DA57E3-D873-4178-874D-95EF62358774}" presName="LevelTwoTextNode" presStyleLbl="node3" presStyleIdx="0" presStyleCnt="3" custScaleX="120551" custScaleY="184497" custLinFactNeighborX="4314" custLinFactNeighborY="-13378">
+      <dgm:prSet presAssocID="{70DA57E3-D873-4178-874D-95EF62358774}" presName="LevelTwoTextNode" presStyleLbl="node3" presStyleIdx="0" presStyleCnt="4" custScaleX="120551" custScaleY="184497" custLinFactNeighborX="4920" custLinFactNeighborY="-23560">
         <dgm:presLayoutVars>
           <dgm:chPref val="3"/>
         </dgm:presLayoutVars>
@@ -3577,11 +3758,11 @@
       <dgm:spPr/>
     </dgm:pt>
     <dgm:pt modelId="{F52C6B63-4661-4D7C-8522-9E266A2D887E}" type="pres">
-      <dgm:prSet presAssocID="{350A42B2-3627-4557-A408-5146A83F6037}" presName="conn2-1" presStyleLbl="parChTrans1D2" presStyleIdx="1" presStyleCnt="3"/>
+      <dgm:prSet presAssocID="{350A42B2-3627-4557-A408-5146A83F6037}" presName="conn2-1" presStyleLbl="parChTrans1D2" presStyleIdx="1" presStyleCnt="4"/>
       <dgm:spPr/>
     </dgm:pt>
     <dgm:pt modelId="{51F072A5-02B4-4B0B-BBBD-6565DB6CCCC2}" type="pres">
-      <dgm:prSet presAssocID="{350A42B2-3627-4557-A408-5146A83F6037}" presName="connTx" presStyleLbl="parChTrans1D2" presStyleIdx="1" presStyleCnt="3"/>
+      <dgm:prSet presAssocID="{350A42B2-3627-4557-A408-5146A83F6037}" presName="connTx" presStyleLbl="parChTrans1D2" presStyleIdx="1" presStyleCnt="4"/>
       <dgm:spPr/>
     </dgm:pt>
     <dgm:pt modelId="{FE6E2489-C02D-4B4D-B1D4-6346C7A86062}" type="pres">
@@ -3589,7 +3770,7 @@
       <dgm:spPr/>
     </dgm:pt>
     <dgm:pt modelId="{3F6DCDF8-B3B3-4864-84F1-E8EE86C59F4E}" type="pres">
-      <dgm:prSet presAssocID="{0691221E-BAAF-42D8-816E-AB49F1C97DD5}" presName="LevelTwoTextNode" presStyleLbl="node2" presStyleIdx="1" presStyleCnt="3" custLinFactNeighborX="1656" custLinFactNeighborY="197">
+      <dgm:prSet presAssocID="{0691221E-BAAF-42D8-816E-AB49F1C97DD5}" presName="LevelTwoTextNode" presStyleLbl="node2" presStyleIdx="1" presStyleCnt="4" custScaleX="57641" custLinFactNeighborX="-36665" custLinFactNeighborY="-2324">
         <dgm:presLayoutVars>
           <dgm:chPref val="3"/>
         </dgm:presLayoutVars>
@@ -3601,11 +3782,11 @@
       <dgm:spPr/>
     </dgm:pt>
     <dgm:pt modelId="{A0916046-837B-4104-ABA9-033E1E503F7A}" type="pres">
-      <dgm:prSet presAssocID="{1152F76D-DCF1-492E-8C2B-95E4FBBF72B3}" presName="conn2-1" presStyleLbl="parChTrans1D3" presStyleIdx="1" presStyleCnt="3"/>
+      <dgm:prSet presAssocID="{1152F76D-DCF1-492E-8C2B-95E4FBBF72B3}" presName="conn2-1" presStyleLbl="parChTrans1D3" presStyleIdx="1" presStyleCnt="4"/>
       <dgm:spPr/>
     </dgm:pt>
     <dgm:pt modelId="{FBF1A988-E645-464E-A190-C45474D008DF}" type="pres">
-      <dgm:prSet presAssocID="{1152F76D-DCF1-492E-8C2B-95E4FBBF72B3}" presName="connTx" presStyleLbl="parChTrans1D3" presStyleIdx="1" presStyleCnt="3"/>
+      <dgm:prSet presAssocID="{1152F76D-DCF1-492E-8C2B-95E4FBBF72B3}" presName="connTx" presStyleLbl="parChTrans1D3" presStyleIdx="1" presStyleCnt="4"/>
       <dgm:spPr/>
     </dgm:pt>
     <dgm:pt modelId="{B43348E4-8EC7-4193-AF9D-DE3C2F11D317}" type="pres">
@@ -3613,7 +3794,7 @@
       <dgm:spPr/>
     </dgm:pt>
     <dgm:pt modelId="{E6B50FA5-C20E-4DB6-8738-0FF675AB3619}" type="pres">
-      <dgm:prSet presAssocID="{21A26298-6215-4829-9F9D-9C917EF2E3BF}" presName="LevelTwoTextNode" presStyleLbl="node3" presStyleIdx="1" presStyleCnt="3" custScaleX="119135" custScaleY="74087" custLinFactNeighborX="5222" custLinFactNeighborY="-494">
+      <dgm:prSet presAssocID="{21A26298-6215-4829-9F9D-9C917EF2E3BF}" presName="LevelTwoTextNode" presStyleLbl="node3" presStyleIdx="1" presStyleCnt="4" custScaleX="119135" custScaleY="74087" custLinFactNeighborX="4532" custLinFactNeighborY="-4480">
         <dgm:presLayoutVars>
           <dgm:chPref val="3"/>
         </dgm:presLayoutVars>
@@ -3624,12 +3805,60 @@
       <dgm:prSet presAssocID="{21A26298-6215-4829-9F9D-9C917EF2E3BF}" presName="level3hierChild" presStyleCnt="0"/>
       <dgm:spPr/>
     </dgm:pt>
+    <dgm:pt modelId="{E5938F60-F07B-4584-98FB-211C7F0DC3D0}" type="pres">
+      <dgm:prSet presAssocID="{85799810-4233-46E2-ADBF-04E675986D3E}" presName="conn2-1" presStyleLbl="parChTrans1D2" presStyleIdx="2" presStyleCnt="4"/>
+      <dgm:spPr/>
+    </dgm:pt>
+    <dgm:pt modelId="{DE6F23D2-07F4-4B3F-9494-2FF6D30B2C4A}" type="pres">
+      <dgm:prSet presAssocID="{85799810-4233-46E2-ADBF-04E675986D3E}" presName="connTx" presStyleLbl="parChTrans1D2" presStyleIdx="2" presStyleCnt="4"/>
+      <dgm:spPr/>
+    </dgm:pt>
+    <dgm:pt modelId="{3B21F381-3F72-4BCD-8D68-DD40AFD6C531}" type="pres">
+      <dgm:prSet presAssocID="{041B48CF-8F2A-46D6-AB57-1204901271B3}" presName="root2" presStyleCnt="0"/>
+      <dgm:spPr/>
+    </dgm:pt>
+    <dgm:pt modelId="{81093083-EB62-4CFF-8826-BB4EEB96AA49}" type="pres">
+      <dgm:prSet presAssocID="{041B48CF-8F2A-46D6-AB57-1204901271B3}" presName="LevelTwoTextNode" presStyleLbl="node2" presStyleIdx="2" presStyleCnt="4" custScaleX="57641" custLinFactNeighborX="-36665" custLinFactNeighborY="15903">
+        <dgm:presLayoutVars>
+          <dgm:chPref val="3"/>
+        </dgm:presLayoutVars>
+      </dgm:prSet>
+      <dgm:spPr/>
+    </dgm:pt>
+    <dgm:pt modelId="{F2585F0A-059C-4A23-9350-853BF2FDF33F}" type="pres">
+      <dgm:prSet presAssocID="{041B48CF-8F2A-46D6-AB57-1204901271B3}" presName="level3hierChild" presStyleCnt="0"/>
+      <dgm:spPr/>
+    </dgm:pt>
+    <dgm:pt modelId="{B28717B8-B50F-4DAC-BCB7-3C0A7A076977}" type="pres">
+      <dgm:prSet presAssocID="{F8B3CB29-D20D-44F6-8295-4F4A99AE09AB}" presName="conn2-1" presStyleLbl="parChTrans1D3" presStyleIdx="2" presStyleCnt="4"/>
+      <dgm:spPr/>
+    </dgm:pt>
+    <dgm:pt modelId="{F6013E37-8C7F-453C-8E8D-BF6A7F0A9AB0}" type="pres">
+      <dgm:prSet presAssocID="{F8B3CB29-D20D-44F6-8295-4F4A99AE09AB}" presName="connTx" presStyleLbl="parChTrans1D3" presStyleIdx="2" presStyleCnt="4"/>
+      <dgm:spPr/>
+    </dgm:pt>
+    <dgm:pt modelId="{0EF49734-DC46-4F1D-81A6-0EB5F7200F82}" type="pres">
+      <dgm:prSet presAssocID="{F753B001-5355-4F22-ABFB-722AC8443D88}" presName="root2" presStyleCnt="0"/>
+      <dgm:spPr/>
+    </dgm:pt>
+    <dgm:pt modelId="{20934B84-5653-4BA4-8F3E-5605F1934B82}" type="pres">
+      <dgm:prSet presAssocID="{F753B001-5355-4F22-ABFB-722AC8443D88}" presName="LevelTwoTextNode" presStyleLbl="node3" presStyleIdx="2" presStyleCnt="4" custScaleX="121003" custLinFactNeighborX="4920" custLinFactNeighborY="15903">
+        <dgm:presLayoutVars>
+          <dgm:chPref val="3"/>
+        </dgm:presLayoutVars>
+      </dgm:prSet>
+      <dgm:spPr/>
+    </dgm:pt>
+    <dgm:pt modelId="{472EE464-C3E8-44D0-B88B-920CE9D58C46}" type="pres">
+      <dgm:prSet presAssocID="{F753B001-5355-4F22-ABFB-722AC8443D88}" presName="level3hierChild" presStyleCnt="0"/>
+      <dgm:spPr/>
+    </dgm:pt>
     <dgm:pt modelId="{2D2737F4-2433-454B-B201-985ED75C497C}" type="pres">
-      <dgm:prSet presAssocID="{9BE900EA-BDD6-4288-B86A-8112CA416207}" presName="conn2-1" presStyleLbl="parChTrans1D2" presStyleIdx="2" presStyleCnt="3"/>
+      <dgm:prSet presAssocID="{9BE900EA-BDD6-4288-B86A-8112CA416207}" presName="conn2-1" presStyleLbl="parChTrans1D2" presStyleIdx="3" presStyleCnt="4"/>
       <dgm:spPr/>
     </dgm:pt>
     <dgm:pt modelId="{88ECCA98-C1AA-4E9E-AD41-C0DF391D7F3A}" type="pres">
-      <dgm:prSet presAssocID="{9BE900EA-BDD6-4288-B86A-8112CA416207}" presName="connTx" presStyleLbl="parChTrans1D2" presStyleIdx="2" presStyleCnt="3"/>
+      <dgm:prSet presAssocID="{9BE900EA-BDD6-4288-B86A-8112CA416207}" presName="connTx" presStyleLbl="parChTrans1D2" presStyleIdx="3" presStyleCnt="4"/>
       <dgm:spPr/>
     </dgm:pt>
     <dgm:pt modelId="{007BBC22-4EA6-45E4-B623-6B090A3D0BAD}" type="pres">
@@ -3637,7 +3866,7 @@
       <dgm:spPr/>
     </dgm:pt>
     <dgm:pt modelId="{C299407E-F259-4A0E-8199-BC35C4758FCB}" type="pres">
-      <dgm:prSet presAssocID="{47D158F5-750F-4B5D-B114-B22CFFC1D2F8}" presName="LevelTwoTextNode" presStyleLbl="node2" presStyleIdx="2" presStyleCnt="3" custLinFactNeighborX="1656" custLinFactNeighborY="40575">
+      <dgm:prSet presAssocID="{47D158F5-750F-4B5D-B114-B22CFFC1D2F8}" presName="LevelTwoTextNode" presStyleLbl="node2" presStyleIdx="3" presStyleCnt="4" custScaleX="57641" custLinFactNeighborX="-36665" custLinFactNeighborY="13088">
         <dgm:presLayoutVars>
           <dgm:chPref val="3"/>
         </dgm:presLayoutVars>
@@ -3649,11 +3878,11 @@
       <dgm:spPr/>
     </dgm:pt>
     <dgm:pt modelId="{579CC114-B0C8-4452-9EA5-092619357013}" type="pres">
-      <dgm:prSet presAssocID="{EC9DF93B-A0F7-4203-A1FD-2D4F6CA2590F}" presName="conn2-1" presStyleLbl="parChTrans1D3" presStyleIdx="2" presStyleCnt="3"/>
+      <dgm:prSet presAssocID="{EC9DF93B-A0F7-4203-A1FD-2D4F6CA2590F}" presName="conn2-1" presStyleLbl="parChTrans1D3" presStyleIdx="3" presStyleCnt="4"/>
       <dgm:spPr/>
     </dgm:pt>
     <dgm:pt modelId="{154675CC-DA15-4004-A2E2-FB7D23B248E7}" type="pres">
-      <dgm:prSet presAssocID="{EC9DF93B-A0F7-4203-A1FD-2D4F6CA2590F}" presName="connTx" presStyleLbl="parChTrans1D3" presStyleIdx="2" presStyleCnt="3"/>
+      <dgm:prSet presAssocID="{EC9DF93B-A0F7-4203-A1FD-2D4F6CA2590F}" presName="connTx" presStyleLbl="parChTrans1D3" presStyleIdx="3" presStyleCnt="4"/>
       <dgm:spPr/>
     </dgm:pt>
     <dgm:pt modelId="{E6F4E524-B3F7-427D-9F3C-D60C41E30B6D}" type="pres">
@@ -3661,7 +3890,7 @@
       <dgm:spPr/>
     </dgm:pt>
     <dgm:pt modelId="{631DD2BD-E610-4DBC-B2AF-9692B85C6E47}" type="pres">
-      <dgm:prSet presAssocID="{43C1FEA2-79FD-47F6-9416-C2D2350F8B70}" presName="LevelTwoTextNode" presStyleLbl="node3" presStyleIdx="2" presStyleCnt="3" custScaleX="120551" custScaleY="54877" custLinFactNeighborX="5222" custLinFactNeighborY="39884">
+      <dgm:prSet presAssocID="{43C1FEA2-79FD-47F6-9416-C2D2350F8B70}" presName="LevelTwoTextNode" presStyleLbl="node3" presStyleIdx="3" presStyleCnt="4" custScaleX="120551" custScaleY="91628" custLinFactNeighborX="5608" custLinFactNeighborY="11384">
         <dgm:presLayoutVars>
           <dgm:chPref val="3"/>
         </dgm:presLayoutVars>
@@ -3674,11 +3903,16 @@
     </dgm:pt>
   </dgm:ptLst>
   <dgm:cxnLst>
+    <dgm:cxn modelId="{08D2A90A-79BA-4567-9246-091ECC0DDD98}" type="presOf" srcId="{F8B3CB29-D20D-44F6-8295-4F4A99AE09AB}" destId="{B28717B8-B50F-4DAC-BCB7-3C0A7A076977}" srcOrd="0" destOrd="0" presId="urn:microsoft.com/office/officeart/2008/layout/HorizontalMultiLevelHierarchy"/>
     <dgm:cxn modelId="{A0F3D70C-990D-40B5-A3F5-6F018DA6CD52}" type="presOf" srcId="{350A42B2-3627-4557-A408-5146A83F6037}" destId="{F52C6B63-4661-4D7C-8522-9E266A2D887E}" srcOrd="0" destOrd="0" presId="urn:microsoft.com/office/officeart/2008/layout/HorizontalMultiLevelHierarchy"/>
     <dgm:cxn modelId="{D7433F1D-7FA1-44CC-BCF8-346BE7FDEBA0}" type="presOf" srcId="{9BE900EA-BDD6-4288-B86A-8112CA416207}" destId="{88ECCA98-C1AA-4E9E-AD41-C0DF391D7F3A}" srcOrd="1" destOrd="0" presId="urn:microsoft.com/office/officeart/2008/layout/HorizontalMultiLevelHierarchy"/>
     <dgm:cxn modelId="{6CF85E1F-ED6F-4542-A859-E3E9F2CA1B0F}" type="presOf" srcId="{6C47AD6B-531E-4260-9D12-BBC278CA8734}" destId="{09EC65AE-E696-4DE4-977E-F156A7FD5995}" srcOrd="0" destOrd="0" presId="urn:microsoft.com/office/officeart/2008/layout/HorizontalMultiLevelHierarchy"/>
     <dgm:cxn modelId="{B3E0422A-BE9E-40D4-906A-EF614B51A3A6}" type="presOf" srcId="{1152F76D-DCF1-492E-8C2B-95E4FBBF72B3}" destId="{A0916046-837B-4104-ABA9-033E1E503F7A}" srcOrd="0" destOrd="0" presId="urn:microsoft.com/office/officeart/2008/layout/HorizontalMultiLevelHierarchy"/>
+    <dgm:cxn modelId="{6EDA6D34-479C-43B5-9AEB-84936164D58F}" type="presOf" srcId="{85799810-4233-46E2-ADBF-04E675986D3E}" destId="{DE6F23D2-07F4-4B3F-9494-2FF6D30B2C4A}" srcOrd="1" destOrd="0" presId="urn:microsoft.com/office/officeart/2008/layout/HorizontalMultiLevelHierarchy"/>
     <dgm:cxn modelId="{B9F44F38-9331-4BB4-AE25-961D29520D08}" type="presOf" srcId="{47D158F5-750F-4B5D-B114-B22CFFC1D2F8}" destId="{C299407E-F259-4A0E-8199-BC35C4758FCB}" srcOrd="0" destOrd="0" presId="urn:microsoft.com/office/officeart/2008/layout/HorizontalMultiLevelHierarchy"/>
+    <dgm:cxn modelId="{272C6E3C-777E-4BE8-B30E-8CD99FF4ECC7}" type="presOf" srcId="{F753B001-5355-4F22-ABFB-722AC8443D88}" destId="{20934B84-5653-4BA4-8F3E-5605F1934B82}" srcOrd="0" destOrd="0" presId="urn:microsoft.com/office/officeart/2008/layout/HorizontalMultiLevelHierarchy"/>
+    <dgm:cxn modelId="{E2E6EC3C-E3E7-4B4E-8A2E-4BA7ACAA6D39}" srcId="{4781C09F-9D19-4A35-BBE8-F64C47F4824E}" destId="{041B48CF-8F2A-46D6-AB57-1204901271B3}" srcOrd="2" destOrd="0" parTransId="{85799810-4233-46E2-ADBF-04E675986D3E}" sibTransId="{00C029F7-F372-481E-BCAE-A76AA1A18465}"/>
+    <dgm:cxn modelId="{C09D665C-7BBA-446D-A414-BF86950285DE}" type="presOf" srcId="{041B48CF-8F2A-46D6-AB57-1204901271B3}" destId="{81093083-EB62-4CFF-8826-BB4EEB96AA49}" srcOrd="0" destOrd="0" presId="urn:microsoft.com/office/officeart/2008/layout/HorizontalMultiLevelHierarchy"/>
     <dgm:cxn modelId="{FCD6D760-BE19-4F75-A937-1DF2AA282A95}" type="presOf" srcId="{4781C09F-9D19-4A35-BBE8-F64C47F4824E}" destId="{35965975-1763-42E8-A0A9-2B7448BC0B63}" srcOrd="0" destOrd="0" presId="urn:microsoft.com/office/officeart/2008/layout/HorizontalMultiLevelHierarchy"/>
     <dgm:cxn modelId="{2F83D068-DE1D-42A3-8759-0294C83753BD}" type="presOf" srcId="{553EC3AC-C1C9-4BD7-800C-FAA831928C3F}" destId="{F856F9A6-DB9F-4534-879E-7C1E083BDF37}" srcOrd="0" destOrd="0" presId="urn:microsoft.com/office/officeart/2008/layout/HorizontalMultiLevelHierarchy"/>
     <dgm:cxn modelId="{B7BF876A-C5C0-4E6C-B56E-A12D5CCBBCC6}" srcId="{4781C09F-9D19-4A35-BBE8-F64C47F4824E}" destId="{0691221E-BAAF-42D8-816E-AB49F1C97DD5}" srcOrd="1" destOrd="0" parTransId="{350A42B2-3627-4557-A408-5146A83F6037}" sibTransId="{AAB6290E-9B60-4363-AD74-A976C848BCF2}"/>
@@ -3687,12 +3921,15 @@
     <dgm:cxn modelId="{4380B557-B2B0-4060-9BD2-A61D092BE6A5}" srcId="{ED8A4D5A-218A-4FB0-A06E-375793C27C62}" destId="{70DA57E3-D873-4178-874D-95EF62358774}" srcOrd="0" destOrd="0" parTransId="{2DB84DC5-1CFE-462B-BB26-37ED1061BCBB}" sibTransId="{04170948-145F-4017-B478-3508CFA82020}"/>
     <dgm:cxn modelId="{B0E1F977-E51A-473C-8707-F5A60547759D}" type="presOf" srcId="{9BE900EA-BDD6-4288-B86A-8112CA416207}" destId="{2D2737F4-2433-454B-B201-985ED75C497C}" srcOrd="0" destOrd="0" presId="urn:microsoft.com/office/officeart/2008/layout/HorizontalMultiLevelHierarchy"/>
     <dgm:cxn modelId="{CD20217C-194F-4A11-A2D4-CE4718B0D90D}" type="presOf" srcId="{43C1FEA2-79FD-47F6-9416-C2D2350F8B70}" destId="{631DD2BD-E610-4DBC-B2AF-9692B85C6E47}" srcOrd="0" destOrd="0" presId="urn:microsoft.com/office/officeart/2008/layout/HorizontalMultiLevelHierarchy"/>
+    <dgm:cxn modelId="{2539677C-9D06-482D-A938-F5B9B0D17396}" type="presOf" srcId="{85799810-4233-46E2-ADBF-04E675986D3E}" destId="{E5938F60-F07B-4584-98FB-211C7F0DC3D0}" srcOrd="0" destOrd="0" presId="urn:microsoft.com/office/officeart/2008/layout/HorizontalMultiLevelHierarchy"/>
     <dgm:cxn modelId="{A109DD8A-A194-4689-9F4D-E98F86B1355F}" type="presOf" srcId="{21A26298-6215-4829-9F9D-9C917EF2E3BF}" destId="{E6B50FA5-C20E-4DB6-8738-0FF675AB3619}" srcOrd="0" destOrd="0" presId="urn:microsoft.com/office/officeart/2008/layout/HorizontalMultiLevelHierarchy"/>
+    <dgm:cxn modelId="{B4BBE38C-BFD6-4180-96D5-7DB9E25275B2}" srcId="{041B48CF-8F2A-46D6-AB57-1204901271B3}" destId="{F753B001-5355-4F22-ABFB-722AC8443D88}" srcOrd="0" destOrd="0" parTransId="{F8B3CB29-D20D-44F6-8295-4F4A99AE09AB}" sibTransId="{8B528E7C-B229-418D-A34F-F31B14A93FEB}"/>
+    <dgm:cxn modelId="{1F535E8F-8EA4-47B9-936D-05A591AB08B6}" type="presOf" srcId="{F8B3CB29-D20D-44F6-8295-4F4A99AE09AB}" destId="{F6013E37-8C7F-453C-8E8D-BF6A7F0A9AB0}" srcOrd="1" destOrd="0" presId="urn:microsoft.com/office/officeart/2008/layout/HorizontalMultiLevelHierarchy"/>
     <dgm:cxn modelId="{2B454997-EA43-4B5D-9B64-546F73505C7C}" type="presOf" srcId="{ED8A4D5A-218A-4FB0-A06E-375793C27C62}" destId="{05FEF6E4-5CCC-4B28-8EB1-68270640A142}" srcOrd="0" destOrd="0" presId="urn:microsoft.com/office/officeart/2008/layout/HorizontalMultiLevelHierarchy"/>
     <dgm:cxn modelId="{AA367897-3D53-4B50-BC1C-8959E3826817}" srcId="{0691221E-BAAF-42D8-816E-AB49F1C97DD5}" destId="{21A26298-6215-4829-9F9D-9C917EF2E3BF}" srcOrd="0" destOrd="0" parTransId="{1152F76D-DCF1-492E-8C2B-95E4FBBF72B3}" sibTransId="{5B6E1DCC-4935-4A55-A218-9F2E04E0F295}"/>
     <dgm:cxn modelId="{D3A5329D-04E5-47E0-AA6F-FF809B91074F}" type="presOf" srcId="{70DA57E3-D873-4178-874D-95EF62358774}" destId="{C2EAB7C8-65E3-4058-9880-B1310133AB3F}" srcOrd="0" destOrd="0" presId="urn:microsoft.com/office/officeart/2008/layout/HorizontalMultiLevelHierarchy"/>
     <dgm:cxn modelId="{F525529E-17F8-460A-AA35-57C6FDA713DE}" srcId="{47D158F5-750F-4B5D-B114-B22CFFC1D2F8}" destId="{43C1FEA2-79FD-47F6-9416-C2D2350F8B70}" srcOrd="0" destOrd="0" parTransId="{EC9DF93B-A0F7-4203-A1FD-2D4F6CA2590F}" sibTransId="{6EC0AFCE-DD60-42F1-A492-EDC486E67FB1}"/>
-    <dgm:cxn modelId="{0E7263A7-C94F-46D8-B2A2-744EE47CD2CB}" srcId="{4781C09F-9D19-4A35-BBE8-F64C47F4824E}" destId="{47D158F5-750F-4B5D-B114-B22CFFC1D2F8}" srcOrd="2" destOrd="0" parTransId="{9BE900EA-BDD6-4288-B86A-8112CA416207}" sibTransId="{1B00DAB1-3C0D-4A25-AFC3-E0551E793255}"/>
+    <dgm:cxn modelId="{0E7263A7-C94F-46D8-B2A2-744EE47CD2CB}" srcId="{4781C09F-9D19-4A35-BBE8-F64C47F4824E}" destId="{47D158F5-750F-4B5D-B114-B22CFFC1D2F8}" srcOrd="3" destOrd="0" parTransId="{9BE900EA-BDD6-4288-B86A-8112CA416207}" sibTransId="{1B00DAB1-3C0D-4A25-AFC3-E0551E793255}"/>
     <dgm:cxn modelId="{1A803BAA-FC4D-43CE-B6FD-57BAE0D6B6C5}" type="presOf" srcId="{2DB84DC5-1CFE-462B-BB26-37ED1061BCBB}" destId="{573F8E7E-A554-4744-8989-B93E10893469}" srcOrd="0" destOrd="0" presId="urn:microsoft.com/office/officeart/2008/layout/HorizontalMultiLevelHierarchy"/>
     <dgm:cxn modelId="{583418B9-845C-4834-9FF6-14A3A81ABC3A}" type="presOf" srcId="{EC9DF93B-A0F7-4203-A1FD-2D4F6CA2590F}" destId="{154675CC-DA15-4004-A2E2-FB7D23B248E7}" srcOrd="1" destOrd="0" presId="urn:microsoft.com/office/officeart/2008/layout/HorizontalMultiLevelHierarchy"/>
     <dgm:cxn modelId="{656D75B9-1496-47A7-8C49-269F3F0B7AFE}" type="presOf" srcId="{553EC3AC-C1C9-4BD7-800C-FAA831928C3F}" destId="{D4791497-B878-4DD2-9A78-A9BF912BA82F}" srcOrd="1" destOrd="0" presId="urn:microsoft.com/office/officeart/2008/layout/HorizontalMultiLevelHierarchy"/>
@@ -3724,9 +3961,19 @@
     <dgm:cxn modelId="{5237222F-ADD7-4264-9061-D7C8339CADFB}" type="presParOf" srcId="{532B06F4-7123-41D5-9339-A7C6B918C74F}" destId="{B43348E4-8EC7-4193-AF9D-DE3C2F11D317}" srcOrd="1" destOrd="0" presId="urn:microsoft.com/office/officeart/2008/layout/HorizontalMultiLevelHierarchy"/>
     <dgm:cxn modelId="{550F1302-9270-4251-BDAF-9C6E9F976AC6}" type="presParOf" srcId="{B43348E4-8EC7-4193-AF9D-DE3C2F11D317}" destId="{E6B50FA5-C20E-4DB6-8738-0FF675AB3619}" srcOrd="0" destOrd="0" presId="urn:microsoft.com/office/officeart/2008/layout/HorizontalMultiLevelHierarchy"/>
     <dgm:cxn modelId="{035C976D-927E-4365-98D4-77B6E2239D78}" type="presParOf" srcId="{B43348E4-8EC7-4193-AF9D-DE3C2F11D317}" destId="{8765CA51-EF9E-4899-80ED-DC22E6434E3D}" srcOrd="1" destOrd="0" presId="urn:microsoft.com/office/officeart/2008/layout/HorizontalMultiLevelHierarchy"/>
-    <dgm:cxn modelId="{A6EB3D65-A5DE-466D-9561-360C10CC5142}" type="presParOf" srcId="{291E05DC-2F58-46A1-B05B-BA2470D810F4}" destId="{2D2737F4-2433-454B-B201-985ED75C497C}" srcOrd="4" destOrd="0" presId="urn:microsoft.com/office/officeart/2008/layout/HorizontalMultiLevelHierarchy"/>
+    <dgm:cxn modelId="{1D6D1BBE-FE0B-41B1-BBB4-A6E2688FA7E7}" type="presParOf" srcId="{291E05DC-2F58-46A1-B05B-BA2470D810F4}" destId="{E5938F60-F07B-4584-98FB-211C7F0DC3D0}" srcOrd="4" destOrd="0" presId="urn:microsoft.com/office/officeart/2008/layout/HorizontalMultiLevelHierarchy"/>
+    <dgm:cxn modelId="{A21B17D8-FB8D-4769-8F27-C70851D6EE65}" type="presParOf" srcId="{E5938F60-F07B-4584-98FB-211C7F0DC3D0}" destId="{DE6F23D2-07F4-4B3F-9494-2FF6D30B2C4A}" srcOrd="0" destOrd="0" presId="urn:microsoft.com/office/officeart/2008/layout/HorizontalMultiLevelHierarchy"/>
+    <dgm:cxn modelId="{32F99C95-2310-4B2F-B6A8-B1E1844D935C}" type="presParOf" srcId="{291E05DC-2F58-46A1-B05B-BA2470D810F4}" destId="{3B21F381-3F72-4BCD-8D68-DD40AFD6C531}" srcOrd="5" destOrd="0" presId="urn:microsoft.com/office/officeart/2008/layout/HorizontalMultiLevelHierarchy"/>
+    <dgm:cxn modelId="{A3627DAC-24B5-4396-84A8-494B96C0A94F}" type="presParOf" srcId="{3B21F381-3F72-4BCD-8D68-DD40AFD6C531}" destId="{81093083-EB62-4CFF-8826-BB4EEB96AA49}" srcOrd="0" destOrd="0" presId="urn:microsoft.com/office/officeart/2008/layout/HorizontalMultiLevelHierarchy"/>
+    <dgm:cxn modelId="{847618FF-12FE-4166-96F8-38779938559D}" type="presParOf" srcId="{3B21F381-3F72-4BCD-8D68-DD40AFD6C531}" destId="{F2585F0A-059C-4A23-9350-853BF2FDF33F}" srcOrd="1" destOrd="0" presId="urn:microsoft.com/office/officeart/2008/layout/HorizontalMultiLevelHierarchy"/>
+    <dgm:cxn modelId="{74BF163B-1C91-402D-A68A-2D4470094D85}" type="presParOf" srcId="{F2585F0A-059C-4A23-9350-853BF2FDF33F}" destId="{B28717B8-B50F-4DAC-BCB7-3C0A7A076977}" srcOrd="0" destOrd="0" presId="urn:microsoft.com/office/officeart/2008/layout/HorizontalMultiLevelHierarchy"/>
+    <dgm:cxn modelId="{92737644-4DF7-4612-9994-5656D634B217}" type="presParOf" srcId="{B28717B8-B50F-4DAC-BCB7-3C0A7A076977}" destId="{F6013E37-8C7F-453C-8E8D-BF6A7F0A9AB0}" srcOrd="0" destOrd="0" presId="urn:microsoft.com/office/officeart/2008/layout/HorizontalMultiLevelHierarchy"/>
+    <dgm:cxn modelId="{165CECFF-110E-494D-BE35-5A1DDFE9E1E1}" type="presParOf" srcId="{F2585F0A-059C-4A23-9350-853BF2FDF33F}" destId="{0EF49734-DC46-4F1D-81A6-0EB5F7200F82}" srcOrd="1" destOrd="0" presId="urn:microsoft.com/office/officeart/2008/layout/HorizontalMultiLevelHierarchy"/>
+    <dgm:cxn modelId="{D3333A01-D6AB-4987-8555-05E0B385E90B}" type="presParOf" srcId="{0EF49734-DC46-4F1D-81A6-0EB5F7200F82}" destId="{20934B84-5653-4BA4-8F3E-5605F1934B82}" srcOrd="0" destOrd="0" presId="urn:microsoft.com/office/officeart/2008/layout/HorizontalMultiLevelHierarchy"/>
+    <dgm:cxn modelId="{8386B051-8E00-4AC5-8BF8-C164C57D35BB}" type="presParOf" srcId="{0EF49734-DC46-4F1D-81A6-0EB5F7200F82}" destId="{472EE464-C3E8-44D0-B88B-920CE9D58C46}" srcOrd="1" destOrd="0" presId="urn:microsoft.com/office/officeart/2008/layout/HorizontalMultiLevelHierarchy"/>
+    <dgm:cxn modelId="{A6EB3D65-A5DE-466D-9561-360C10CC5142}" type="presParOf" srcId="{291E05DC-2F58-46A1-B05B-BA2470D810F4}" destId="{2D2737F4-2433-454B-B201-985ED75C497C}" srcOrd="6" destOrd="0" presId="urn:microsoft.com/office/officeart/2008/layout/HorizontalMultiLevelHierarchy"/>
     <dgm:cxn modelId="{DC3332F3-4370-4A69-BCAC-59E473064A75}" type="presParOf" srcId="{2D2737F4-2433-454B-B201-985ED75C497C}" destId="{88ECCA98-C1AA-4E9E-AD41-C0DF391D7F3A}" srcOrd="0" destOrd="0" presId="urn:microsoft.com/office/officeart/2008/layout/HorizontalMultiLevelHierarchy"/>
-    <dgm:cxn modelId="{DCC5682E-5069-47F9-8CDD-4A8823C4D689}" type="presParOf" srcId="{291E05DC-2F58-46A1-B05B-BA2470D810F4}" destId="{007BBC22-4EA6-45E4-B623-6B090A3D0BAD}" srcOrd="5" destOrd="0" presId="urn:microsoft.com/office/officeart/2008/layout/HorizontalMultiLevelHierarchy"/>
+    <dgm:cxn modelId="{DCC5682E-5069-47F9-8CDD-4A8823C4D689}" type="presParOf" srcId="{291E05DC-2F58-46A1-B05B-BA2470D810F4}" destId="{007BBC22-4EA6-45E4-B623-6B090A3D0BAD}" srcOrd="7" destOrd="0" presId="urn:microsoft.com/office/officeart/2008/layout/HorizontalMultiLevelHierarchy"/>
     <dgm:cxn modelId="{283C2D8C-BE74-4A0D-8C1B-E1C4232F5A3E}" type="presParOf" srcId="{007BBC22-4EA6-45E4-B623-6B090A3D0BAD}" destId="{C299407E-F259-4A0E-8199-BC35C4758FCB}" srcOrd="0" destOrd="0" presId="urn:microsoft.com/office/officeart/2008/layout/HorizontalMultiLevelHierarchy"/>
     <dgm:cxn modelId="{6197058B-BD57-4A70-8722-595009984A81}" type="presParOf" srcId="{007BBC22-4EA6-45E4-B623-6B090A3D0BAD}" destId="{840C52EA-770B-4957-8EE5-B426FE3AE60B}" srcOrd="1" destOrd="0" presId="urn:microsoft.com/office/officeart/2008/layout/HorizontalMultiLevelHierarchy"/>
     <dgm:cxn modelId="{FA494875-E180-48C5-B3CD-56C5E56785F0}" type="presParOf" srcId="{840C52EA-770B-4957-8EE5-B426FE3AE60B}" destId="{579CC114-B0C8-4452-9EA5-092619357013}" srcOrd="0" destOrd="0" presId="urn:microsoft.com/office/officeart/2008/layout/HorizontalMultiLevelHierarchy"/>
@@ -4471,8 +4718,8 @@
       </dsp:nvSpPr>
       <dsp:spPr>
         <a:xfrm>
-          <a:off x="5974632" y="3703975"/>
-          <a:ext cx="653963" cy="91440"/>
+          <a:off x="4293714" y="4323962"/>
+          <a:ext cx="1755640" cy="91440"/>
         </a:xfrm>
         <a:custGeom>
           <a:avLst/>
@@ -4483,16 +4730,16 @@
           <a:pathLst>
             <a:path>
               <a:moveTo>
-                <a:pt x="0" y="51566"/>
+                <a:pt x="0" y="46430"/>
               </a:moveTo>
               <a:lnTo>
-                <a:pt x="326981" y="51566"/>
+                <a:pt x="877820" y="46430"/>
               </a:lnTo>
               <a:lnTo>
-                <a:pt x="326981" y="45720"/>
+                <a:pt x="877820" y="45720"/>
               </a:lnTo>
               <a:lnTo>
-                <a:pt x="653963" y="45720"/>
+                <a:pt x="1755640" y="45720"/>
               </a:lnTo>
             </a:path>
           </a:pathLst>
@@ -4531,7 +4778,7 @@
         </a:bodyPr>
         <a:lstStyle/>
         <a:p>
-          <a:pPr marL="0" lvl="0" indent="0" algn="ctr" defTabSz="222250">
+          <a:pPr marL="0" lvl="0" indent="0" algn="ctr" defTabSz="266700">
             <a:lnSpc>
               <a:spcPct val="90000"/>
             </a:lnSpc>
@@ -4543,12 +4790,12 @@
             </a:spcAft>
             <a:buNone/>
           </a:pPr>
-          <a:endParaRPr lang="en-ID" sz="500" kern="1200"/>
+          <a:endParaRPr lang="en-ID" sz="600" kern="1200"/>
         </a:p>
       </dsp:txBody>
       <dsp:txXfrm>
-        <a:off x="6285263" y="3733345"/>
-        <a:ext cx="32699" cy="32699"/>
+        <a:off x="5127643" y="4325791"/>
+        <a:ext cx="87782" cy="87782"/>
       </dsp:txXfrm>
     </dsp:sp>
     <dsp:sp modelId="{2D2737F4-2433-454B-B201-985ED75C497C}">
@@ -4558,8 +4805,8 @@
       </dsp:nvSpPr>
       <dsp:spPr>
         <a:xfrm>
-          <a:off x="2631816" y="2235144"/>
-          <a:ext cx="567786" cy="1520396"/>
+          <a:off x="1367469" y="2538232"/>
+          <a:ext cx="1301192" cy="1832160"/>
         </a:xfrm>
         <a:custGeom>
           <a:avLst/>
@@ -4573,13 +4820,181 @@
                 <a:pt x="0" y="0"/>
               </a:moveTo>
               <a:lnTo>
-                <a:pt x="283893" y="0"/>
+                <a:pt x="650596" y="0"/>
               </a:lnTo>
               <a:lnTo>
-                <a:pt x="283893" y="1520396"/>
+                <a:pt x="650596" y="1832160"/>
               </a:lnTo>
               <a:lnTo>
-                <a:pt x="567786" y="1520396"/>
+                <a:pt x="1301192" y="1832160"/>
+              </a:lnTo>
+            </a:path>
+          </a:pathLst>
+        </a:custGeom>
+        <a:noFill/>
+        <a:ln w="12700" cap="flat" cmpd="sng" algn="ctr">
+          <a:solidFill>
+            <a:schemeClr val="accent1">
+              <a:shade val="60000"/>
+              <a:hueOff val="0"/>
+              <a:satOff val="0"/>
+              <a:lumOff val="0"/>
+              <a:alphaOff val="0"/>
+            </a:schemeClr>
+          </a:solidFill>
+          <a:prstDash val="solid"/>
+          <a:miter lim="800000"/>
+        </a:ln>
+        <a:effectLst/>
+      </dsp:spPr>
+      <dsp:style>
+        <a:lnRef idx="2">
+          <a:scrgbClr r="0" g="0" b="0"/>
+        </a:lnRef>
+        <a:fillRef idx="0">
+          <a:scrgbClr r="0" g="0" b="0"/>
+        </a:fillRef>
+        <a:effectRef idx="0">
+          <a:scrgbClr r="0" g="0" b="0"/>
+        </a:effectRef>
+        <a:fontRef idx="minor"/>
+      </dsp:style>
+      <dsp:txBody>
+        <a:bodyPr spcFirstLastPara="0" vert="horz" wrap="square" lIns="12700" tIns="0" rIns="12700" bIns="0" numCol="1" spcCol="1270" anchor="ctr" anchorCtr="0">
+          <a:noAutofit/>
+        </a:bodyPr>
+        <a:lstStyle/>
+        <a:p>
+          <a:pPr marL="0" lvl="0" indent="0" algn="ctr" defTabSz="355600">
+            <a:lnSpc>
+              <a:spcPct val="90000"/>
+            </a:lnSpc>
+            <a:spcBef>
+              <a:spcPct val="0"/>
+            </a:spcBef>
+            <a:spcAft>
+              <a:spcPct val="35000"/>
+            </a:spcAft>
+            <a:buNone/>
+          </a:pPr>
+          <a:endParaRPr lang="en-ID" sz="800" kern="1200"/>
+        </a:p>
+      </dsp:txBody>
+      <dsp:txXfrm>
+        <a:off x="1961885" y="3398132"/>
+        <a:ext cx="112360" cy="112360"/>
+      </dsp:txXfrm>
+    </dsp:sp>
+    <dsp:sp modelId="{B28717B8-B50F-4DAC-BCB7-3C0A7A076977}">
+      <dsp:nvSpPr>
+        <dsp:cNvPr id="0" name=""/>
+        <dsp:cNvSpPr/>
+      </dsp:nvSpPr>
+      <dsp:spPr>
+        <a:xfrm>
+          <a:off x="4293714" y="3288389"/>
+          <a:ext cx="1736244" cy="91440"/>
+        </a:xfrm>
+        <a:custGeom>
+          <a:avLst/>
+          <a:gdLst/>
+          <a:ahLst/>
+          <a:cxnLst/>
+          <a:rect l="0" t="0" r="0" b="0"/>
+          <a:pathLst>
+            <a:path>
+              <a:moveTo>
+                <a:pt x="0" y="45720"/>
+              </a:moveTo>
+              <a:lnTo>
+                <a:pt x="1736244" y="45720"/>
+              </a:lnTo>
+            </a:path>
+          </a:pathLst>
+        </a:custGeom>
+        <a:noFill/>
+        <a:ln w="12700" cap="flat" cmpd="sng" algn="ctr">
+          <a:solidFill>
+            <a:schemeClr val="accent1">
+              <a:shade val="80000"/>
+              <a:hueOff val="0"/>
+              <a:satOff val="0"/>
+              <a:lumOff val="0"/>
+              <a:alphaOff val="0"/>
+            </a:schemeClr>
+          </a:solidFill>
+          <a:prstDash val="solid"/>
+          <a:miter lim="800000"/>
+        </a:ln>
+        <a:effectLst/>
+      </dsp:spPr>
+      <dsp:style>
+        <a:lnRef idx="2">
+          <a:scrgbClr r="0" g="0" b="0"/>
+        </a:lnRef>
+        <a:fillRef idx="0">
+          <a:scrgbClr r="0" g="0" b="0"/>
+        </a:fillRef>
+        <a:effectRef idx="0">
+          <a:scrgbClr r="0" g="0" b="0"/>
+        </a:effectRef>
+        <a:fontRef idx="minor"/>
+      </dsp:style>
+      <dsp:txBody>
+        <a:bodyPr spcFirstLastPara="0" vert="horz" wrap="square" lIns="12700" tIns="0" rIns="12700" bIns="0" numCol="1" spcCol="1270" anchor="ctr" anchorCtr="0">
+          <a:noAutofit/>
+        </a:bodyPr>
+        <a:lstStyle/>
+        <a:p>
+          <a:pPr marL="0" lvl="0" indent="0" algn="ctr" defTabSz="266700">
+            <a:lnSpc>
+              <a:spcPct val="90000"/>
+            </a:lnSpc>
+            <a:spcBef>
+              <a:spcPct val="0"/>
+            </a:spcBef>
+            <a:spcAft>
+              <a:spcPct val="35000"/>
+            </a:spcAft>
+            <a:buNone/>
+          </a:pPr>
+          <a:endParaRPr lang="en-ID" sz="600" kern="1200"/>
+        </a:p>
+      </dsp:txBody>
+      <dsp:txXfrm>
+        <a:off x="5118430" y="3290703"/>
+        <a:ext cx="86812" cy="86812"/>
+      </dsp:txXfrm>
+    </dsp:sp>
+    <dsp:sp modelId="{E5938F60-F07B-4584-98FB-211C7F0DC3D0}">
+      <dsp:nvSpPr>
+        <dsp:cNvPr id="0" name=""/>
+        <dsp:cNvSpPr/>
+      </dsp:nvSpPr>
+      <dsp:spPr>
+        <a:xfrm>
+          <a:off x="1367469" y="2538232"/>
+          <a:ext cx="1301192" cy="795877"/>
+        </a:xfrm>
+        <a:custGeom>
+          <a:avLst/>
+          <a:gdLst/>
+          <a:ahLst/>
+          <a:cxnLst/>
+          <a:rect l="0" t="0" r="0" b="0"/>
+          <a:pathLst>
+            <a:path>
+              <a:moveTo>
+                <a:pt x="0" y="0"/>
+              </a:moveTo>
+              <a:lnTo>
+                <a:pt x="650596" y="0"/>
+              </a:lnTo>
+              <a:lnTo>
+                <a:pt x="650596" y="795877"/>
+              </a:lnTo>
+              <a:lnTo>
+                <a:pt x="1301192" y="795877"/>
               </a:lnTo>
             </a:path>
           </a:pathLst>
@@ -4634,8 +5049,8 @@
         </a:p>
       </dsp:txBody>
       <dsp:txXfrm>
-        <a:off x="2875136" y="2954769"/>
-        <a:ext cx="81147" cy="81147"/>
+        <a:off x="1979933" y="2898038"/>
+        <a:ext cx="76264" cy="76264"/>
       </dsp:txXfrm>
     </dsp:sp>
     <dsp:sp modelId="{A0916046-837B-4104-ABA9-033E1E503F7A}">
@@ -4645,8 +5060,8 @@
       </dsp:nvSpPr>
       <dsp:spPr>
         <a:xfrm>
-          <a:off x="5974632" y="2304802"/>
-          <a:ext cx="653963" cy="91440"/>
+          <a:off x="4293714" y="2038776"/>
+          <a:ext cx="1725305" cy="91440"/>
         </a:xfrm>
         <a:custGeom>
           <a:avLst/>
@@ -4657,16 +5072,16 @@
           <a:pathLst>
             <a:path>
               <a:moveTo>
-                <a:pt x="0" y="51566"/>
+                <a:pt x="0" y="64251"/>
               </a:moveTo>
               <a:lnTo>
-                <a:pt x="326981" y="51566"/>
+                <a:pt x="862652" y="64251"/>
               </a:lnTo>
               <a:lnTo>
-                <a:pt x="326981" y="45720"/>
+                <a:pt x="862652" y="45720"/>
               </a:lnTo>
               <a:lnTo>
-                <a:pt x="653963" y="45720"/>
+                <a:pt x="1725305" y="45720"/>
               </a:lnTo>
             </a:path>
           </a:pathLst>
@@ -4705,7 +5120,7 @@
         </a:bodyPr>
         <a:lstStyle/>
         <a:p>
-          <a:pPr marL="0" lvl="0" indent="0" algn="ctr" defTabSz="222250">
+          <a:pPr marL="0" lvl="0" indent="0" algn="ctr" defTabSz="266700">
             <a:lnSpc>
               <a:spcPct val="90000"/>
             </a:lnSpc>
@@ -4717,12 +5132,12 @@
             </a:spcAft>
             <a:buNone/>
           </a:pPr>
-          <a:endParaRPr lang="en-ID" sz="500" kern="1200"/>
+          <a:endParaRPr lang="en-ID" sz="600" kern="1200"/>
         </a:p>
       </dsp:txBody>
       <dsp:txXfrm>
-        <a:off x="6285263" y="2334172"/>
-        <a:ext cx="32699" cy="32699"/>
+        <a:off x="5113231" y="2041361"/>
+        <a:ext cx="86270" cy="86270"/>
       </dsp:txXfrm>
     </dsp:sp>
     <dsp:sp modelId="{F52C6B63-4661-4D7C-8522-9E266A2D887E}">
@@ -4732,8 +5147,8 @@
       </dsp:nvSpPr>
       <dsp:spPr>
         <a:xfrm>
-          <a:off x="2631816" y="2235144"/>
-          <a:ext cx="567786" cy="121223"/>
+          <a:off x="1367469" y="2103027"/>
+          <a:ext cx="1301192" cy="435204"/>
         </a:xfrm>
         <a:custGeom>
           <a:avLst/>
@@ -4744,16 +5159,16 @@
           <a:pathLst>
             <a:path>
               <a:moveTo>
-                <a:pt x="0" y="0"/>
+                <a:pt x="0" y="435204"/>
               </a:moveTo>
               <a:lnTo>
-                <a:pt x="283893" y="0"/>
+                <a:pt x="650596" y="435204"/>
               </a:lnTo>
               <a:lnTo>
-                <a:pt x="283893" y="121223"/>
+                <a:pt x="650596" y="0"/>
               </a:lnTo>
               <a:lnTo>
-                <a:pt x="567786" y="121223"/>
+                <a:pt x="1301192" y="0"/>
               </a:lnTo>
             </a:path>
           </a:pathLst>
@@ -4808,8 +5223,8 @@
         </a:p>
       </dsp:txBody>
       <dsp:txXfrm>
-        <a:off x="2901195" y="2281242"/>
-        <a:ext cx="29029" cy="29029"/>
+        <a:off x="1983764" y="2286329"/>
+        <a:ext cx="68602" cy="68602"/>
       </dsp:txXfrm>
     </dsp:sp>
     <dsp:sp modelId="{573F8E7E-A554-4744-8989-B93E10893469}">
@@ -4819,8 +5234,8 @@
       </dsp:nvSpPr>
       <dsp:spPr>
         <a:xfrm>
-          <a:off x="5974632" y="890417"/>
-          <a:ext cx="628766" cy="91440"/>
+          <a:off x="4293714" y="747185"/>
+          <a:ext cx="1736244" cy="91440"/>
         </a:xfrm>
         <a:custGeom>
           <a:avLst/>
@@ -4831,10 +5246,16 @@
           <a:pathLst>
             <a:path>
               <a:moveTo>
-                <a:pt x="0" y="45720"/>
+                <a:pt x="0" y="46113"/>
               </a:moveTo>
               <a:lnTo>
-                <a:pt x="628766" y="45720"/>
+                <a:pt x="868122" y="46113"/>
+              </a:lnTo>
+              <a:lnTo>
+                <a:pt x="868122" y="45720"/>
+              </a:lnTo>
+              <a:lnTo>
+                <a:pt x="1736244" y="45720"/>
               </a:lnTo>
             </a:path>
           </a:pathLst>
@@ -4873,7 +5294,7 @@
         </a:bodyPr>
         <a:lstStyle/>
         <a:p>
-          <a:pPr marL="0" lvl="0" indent="0" algn="ctr" defTabSz="222250">
+          <a:pPr marL="0" lvl="0" indent="0" algn="ctr" defTabSz="266700">
             <a:lnSpc>
               <a:spcPct val="90000"/>
             </a:lnSpc>
@@ -4885,12 +5306,12 @@
             </a:spcAft>
             <a:buNone/>
           </a:pPr>
-          <a:endParaRPr lang="en-ID" sz="500" kern="1200"/>
+          <a:endParaRPr lang="en-ID" sz="600" kern="1200"/>
         </a:p>
       </dsp:txBody>
       <dsp:txXfrm>
-        <a:off x="6273295" y="920418"/>
-        <a:ext cx="31438" cy="31438"/>
+        <a:off x="5118430" y="749499"/>
+        <a:ext cx="86812" cy="86812"/>
       </dsp:txXfrm>
     </dsp:sp>
     <dsp:sp modelId="{F856F9A6-DB9F-4534-879E-7C1E083BDF37}">
@@ -4900,8 +5321,8 @@
       </dsp:nvSpPr>
       <dsp:spPr>
         <a:xfrm>
-          <a:off x="2631816" y="936137"/>
-          <a:ext cx="567786" cy="1299007"/>
+          <a:off x="1367469" y="793298"/>
+          <a:ext cx="1301192" cy="1744933"/>
         </a:xfrm>
         <a:custGeom>
           <a:avLst/>
@@ -4912,16 +5333,16 @@
           <a:pathLst>
             <a:path>
               <a:moveTo>
-                <a:pt x="0" y="1299007"/>
+                <a:pt x="0" y="1744933"/>
               </a:moveTo>
               <a:lnTo>
-                <a:pt x="283893" y="1299007"/>
+                <a:pt x="650596" y="1744933"/>
               </a:lnTo>
               <a:lnTo>
-                <a:pt x="283893" y="0"/>
+                <a:pt x="650596" y="0"/>
               </a:lnTo>
               <a:lnTo>
-                <a:pt x="567786" y="0"/>
+                <a:pt x="1301192" y="0"/>
               </a:lnTo>
             </a:path>
           </a:pathLst>
@@ -4960,7 +5381,7 @@
         </a:bodyPr>
         <a:lstStyle/>
         <a:p>
-          <a:pPr marL="0" lvl="0" indent="0" algn="ctr" defTabSz="222250">
+          <a:pPr marL="0" lvl="0" indent="0" algn="ctr" defTabSz="311150">
             <a:lnSpc>
               <a:spcPct val="90000"/>
             </a:lnSpc>
@@ -4972,12 +5393,12 @@
             </a:spcAft>
             <a:buNone/>
           </a:pPr>
-          <a:endParaRPr lang="en-ID" sz="500" kern="1200"/>
+          <a:endParaRPr lang="en-ID" sz="700" kern="1200"/>
         </a:p>
       </dsp:txBody>
       <dsp:txXfrm>
-        <a:off x="2880268" y="1550199"/>
-        <a:ext cx="70883" cy="70883"/>
+        <a:off x="1963648" y="1611348"/>
+        <a:ext cx="108833" cy="108833"/>
       </dsp:txXfrm>
     </dsp:sp>
     <dsp:sp modelId="{35965975-1763-42E8-A0A9-2B7448BC0B63}">
@@ -4987,8 +5408,8 @@
       </dsp:nvSpPr>
       <dsp:spPr>
         <a:xfrm rot="16200000">
-          <a:off x="-17641" y="1812122"/>
-          <a:ext cx="4452870" cy="846045"/>
+          <a:off x="-1324223" y="2108466"/>
+          <a:ext cx="4523852" cy="859532"/>
         </a:xfrm>
         <a:prstGeom prst="rect">
           <a:avLst/>
@@ -5020,12 +5441,12 @@
         </a:fontRef>
       </dsp:style>
       <dsp:txBody>
-        <a:bodyPr spcFirstLastPara="0" vert="horz" wrap="square" lIns="17780" tIns="17780" rIns="17780" bIns="17780" numCol="1" spcCol="1270" anchor="ctr" anchorCtr="0">
+        <a:bodyPr spcFirstLastPara="0" vert="horz" wrap="square" lIns="18415" tIns="18415" rIns="18415" bIns="18415" numCol="1" spcCol="1270" anchor="ctr" anchorCtr="0">
           <a:noAutofit/>
         </a:bodyPr>
         <a:lstStyle/>
         <a:p>
-          <a:pPr marL="0" lvl="0" indent="0" algn="ctr" defTabSz="1244600">
+          <a:pPr marL="0" lvl="0" indent="0" algn="ctr" defTabSz="1289050">
             <a:lnSpc>
               <a:spcPct val="90000"/>
             </a:lnSpc>
@@ -5038,7 +5459,7 @@
             <a:buNone/>
           </a:pPr>
           <a:r>
-            <a:rPr lang="en-ID" sz="2800" kern="1200" dirty="0">
+            <a:rPr lang="en-ID" sz="2900" kern="1200" dirty="0">
               <a:solidFill>
                 <a:srgbClr val="50698F"/>
               </a:solidFill>
@@ -5048,8 +5469,8 @@
         </a:p>
       </dsp:txBody>
       <dsp:txXfrm>
-        <a:off x="-17641" y="1812122"/>
-        <a:ext cx="4452870" cy="846045"/>
+        <a:off x="-1324223" y="2108466"/>
+        <a:ext cx="4523852" cy="859532"/>
       </dsp:txXfrm>
     </dsp:sp>
     <dsp:sp modelId="{05FEF6E4-5CCC-4B28-8EB1-68270640A142}">
@@ -5059,8 +5480,8 @@
       </dsp:nvSpPr>
       <dsp:spPr>
         <a:xfrm>
-          <a:off x="3199603" y="513114"/>
-          <a:ext cx="2775028" cy="846045"/>
+          <a:off x="2668661" y="363532"/>
+          <a:ext cx="1625052" cy="859532"/>
         </a:xfrm>
         <a:prstGeom prst="rect">
           <a:avLst/>
@@ -5097,12 +5518,12 @@
         </a:fontRef>
       </dsp:style>
       <dsp:txBody>
-        <a:bodyPr spcFirstLastPara="0" vert="horz" wrap="square" lIns="17780" tIns="17780" rIns="17780" bIns="17780" numCol="1" spcCol="1270" anchor="ctr" anchorCtr="0">
+        <a:bodyPr spcFirstLastPara="0" vert="horz" wrap="square" lIns="12700" tIns="12700" rIns="12700" bIns="12700" numCol="1" spcCol="1270" anchor="ctr" anchorCtr="0">
           <a:noAutofit/>
         </a:bodyPr>
         <a:lstStyle/>
         <a:p>
-          <a:pPr marL="0" lvl="0" indent="0" algn="ctr" defTabSz="1244600">
+          <a:pPr marL="0" lvl="0" indent="0" algn="ctr" defTabSz="889000">
             <a:lnSpc>
               <a:spcPct val="90000"/>
             </a:lnSpc>
@@ -5115,14 +5536,14 @@
             <a:buNone/>
           </a:pPr>
           <a:r>
-            <a:rPr lang="en-ID" sz="2800" kern="1200" dirty="0" err="1">
+            <a:rPr lang="en-ID" sz="2000" kern="1200" dirty="0" err="1">
               <a:solidFill>
                 <a:srgbClr val="50698F"/>
               </a:solidFill>
             </a:rPr>
-            <a:t>Github</a:t>
+            <a:t>Rizalespe</a:t>
           </a:r>
-          <a:endParaRPr lang="en-ID" sz="2800" kern="1200" dirty="0">
+          <a:endParaRPr lang="en-ID" sz="2000" kern="1200" dirty="0">
             <a:solidFill>
               <a:srgbClr val="50698F"/>
             </a:solidFill>
@@ -5130,8 +5551,8 @@
         </a:p>
       </dsp:txBody>
       <dsp:txXfrm>
-        <a:off x="3199603" y="513114"/>
-        <a:ext cx="2775028" cy="846045"/>
+        <a:off x="2668661" y="363532"/>
+        <a:ext cx="1625052" cy="859532"/>
       </dsp:txXfrm>
     </dsp:sp>
     <dsp:sp modelId="{C2EAB7C8-65E3-4058-9880-B1310133AB3F}">
@@ -5141,8 +5562,8 @@
       </dsp:nvSpPr>
       <dsp:spPr>
         <a:xfrm>
-          <a:off x="6603398" y="155673"/>
-          <a:ext cx="3345324" cy="1560928"/>
+          <a:off x="6029958" y="0"/>
+          <a:ext cx="3398652" cy="1585810"/>
         </a:xfrm>
         <a:prstGeom prst="rect">
           <a:avLst/>
@@ -5586,8 +6007,8 @@
         </a:p>
       </dsp:txBody>
       <dsp:txXfrm>
-        <a:off x="6603398" y="155673"/>
-        <a:ext cx="3345324" cy="1560928"/>
+        <a:off x="6029958" y="0"/>
+        <a:ext cx="3398652" cy="1585810"/>
       </dsp:txXfrm>
     </dsp:sp>
     <dsp:sp modelId="{3F6DCDF8-B3B3-4864-84F1-E8EE86C59F4E}">
@@ -5597,8 +6018,8 @@
       </dsp:nvSpPr>
       <dsp:spPr>
         <a:xfrm>
-          <a:off x="3199603" y="1933345"/>
-          <a:ext cx="2775028" cy="846045"/>
+          <a:off x="2668661" y="1673261"/>
+          <a:ext cx="1625052" cy="859532"/>
         </a:xfrm>
         <a:prstGeom prst="rect">
           <a:avLst/>
@@ -5635,12 +6056,12 @@
         </a:fontRef>
       </dsp:style>
       <dsp:txBody>
-        <a:bodyPr spcFirstLastPara="0" vert="horz" wrap="square" lIns="17780" tIns="17780" rIns="17780" bIns="17780" numCol="1" spcCol="1270" anchor="ctr" anchorCtr="0">
+        <a:bodyPr spcFirstLastPara="0" vert="horz" wrap="square" lIns="12700" tIns="12700" rIns="12700" bIns="12700" numCol="1" spcCol="1270" anchor="ctr" anchorCtr="0">
           <a:noAutofit/>
         </a:bodyPr>
         <a:lstStyle/>
         <a:p>
-          <a:pPr marL="0" lvl="0" indent="0" algn="ctr" defTabSz="1244600">
+          <a:pPr marL="0" lvl="0" indent="0" algn="ctr" defTabSz="889000">
             <a:lnSpc>
               <a:spcPct val="90000"/>
             </a:lnSpc>
@@ -5653,14 +6074,14 @@
             <a:buNone/>
           </a:pPr>
           <a:r>
-            <a:rPr lang="en-ID" sz="2800" kern="1200" dirty="0" err="1">
+            <a:rPr lang="en-ID" sz="2000" kern="1200" dirty="0" err="1">
               <a:solidFill>
                 <a:srgbClr val="50698F"/>
               </a:solidFill>
             </a:rPr>
             <a:t>IndoNLU</a:t>
           </a:r>
-          <a:endParaRPr lang="en-ID" sz="2800" kern="1200" dirty="0">
+          <a:endParaRPr lang="en-ID" sz="2000" kern="1200" dirty="0">
             <a:solidFill>
               <a:srgbClr val="50698F"/>
             </a:solidFill>
@@ -5668,8 +6089,8 @@
         </a:p>
       </dsp:txBody>
       <dsp:txXfrm>
-        <a:off x="3199603" y="1933345"/>
-        <a:ext cx="2775028" cy="846045"/>
+        <a:off x="2668661" y="1673261"/>
+        <a:ext cx="1625052" cy="859532"/>
       </dsp:txXfrm>
     </dsp:sp>
     <dsp:sp modelId="{E6B50FA5-C20E-4DB6-8738-0FF675AB3619}">
@@ -5679,8 +6100,8 @@
       </dsp:nvSpPr>
       <dsp:spPr>
         <a:xfrm>
-          <a:off x="6628595" y="2037117"/>
-          <a:ext cx="3306030" cy="626809"/>
+          <a:off x="6019019" y="1766095"/>
+          <a:ext cx="3358731" cy="636801"/>
         </a:xfrm>
         <a:prstGeom prst="rect">
           <a:avLst/>
@@ -5738,36 +6159,12 @@
             <a:buNone/>
           </a:pPr>
           <a:r>
-            <a:rPr lang="en-ID" sz="900" b="1" kern="1200" dirty="0" err="1">
-              <a:solidFill>
-                <a:srgbClr val="003781"/>
-              </a:solidFill>
-            </a:rPr>
-            <a:t>Github</a:t>
-          </a:r>
-          <a:r>
             <a:rPr lang="en-ID" sz="900" b="1" kern="1200" dirty="0">
               <a:solidFill>
                 <a:srgbClr val="003781"/>
               </a:solidFill>
             </a:rPr>
-            <a:t> – </a:t>
-          </a:r>
-          <a:r>
-            <a:rPr lang="en-ID" sz="900" b="1" kern="1200" dirty="0" err="1">
-              <a:solidFill>
-                <a:srgbClr val="003781"/>
-              </a:solidFill>
-            </a:rPr>
-            <a:t>indobenchmark</a:t>
-          </a:r>
-          <a:r>
-            <a:rPr lang="en-ID" sz="900" b="1" kern="1200" dirty="0">
-              <a:solidFill>
-                <a:srgbClr val="003781"/>
-              </a:solidFill>
-            </a:rPr>
-            <a:t> (</a:t>
+            <a:t>(</a:t>
           </a:r>
           <a:r>
             <a:rPr lang="en-ID" sz="900" b="1" kern="1200" dirty="0">
@@ -5794,23 +6191,88 @@
             </a:rPr>
             <a:t> </a:t>
           </a:r>
+        </a:p>
+        <a:p>
+          <a:pPr marL="0" lvl="0" indent="0" algn="l" defTabSz="400050">
+            <a:lnSpc>
+              <a:spcPct val="90000"/>
+            </a:lnSpc>
+            <a:spcBef>
+              <a:spcPct val="0"/>
+            </a:spcBef>
+            <a:spcAft>
+              <a:spcPct val="35000"/>
+            </a:spcAft>
+            <a:buNone/>
+          </a:pPr>
+          <a:r>
+            <a:rPr lang="en-ID" sz="900" kern="1200" dirty="0">
+              <a:solidFill>
+                <a:srgbClr val="003781"/>
+              </a:solidFill>
+            </a:rPr>
+            <a:t>- </a:t>
+          </a:r>
+          <a:r>
+            <a:rPr lang="en-ID" sz="900" kern="1200" dirty="0" err="1">
+              <a:solidFill>
+                <a:srgbClr val="003781"/>
+              </a:solidFill>
+            </a:rPr>
+            <a:t>smsa_doc</a:t>
+          </a:r>
+          <a:r>
+            <a:rPr lang="en-ID" sz="900" kern="1200" dirty="0">
+              <a:solidFill>
+                <a:srgbClr val="003781"/>
+              </a:solidFill>
+            </a:rPr>
+            <a:t>-sentiment-</a:t>
+          </a:r>
+          <a:r>
+            <a:rPr lang="en-ID" sz="900" kern="1200" dirty="0" err="1">
+              <a:solidFill>
+                <a:srgbClr val="003781"/>
+              </a:solidFill>
+            </a:rPr>
+            <a:t>prosa</a:t>
+          </a:r>
+          <a:endParaRPr lang="en-ID" sz="900" kern="1200" dirty="0">
+            <a:solidFill>
+              <a:srgbClr val="003781"/>
+            </a:solidFill>
+          </a:endParaRPr>
+        </a:p>
+        <a:p>
+          <a:pPr marL="0" lvl="0" indent="0" algn="l" defTabSz="400050">
+            <a:lnSpc>
+              <a:spcPct val="90000"/>
+            </a:lnSpc>
+            <a:spcBef>
+              <a:spcPct val="0"/>
+            </a:spcBef>
+            <a:spcAft>
+              <a:spcPct val="35000"/>
+            </a:spcAft>
+            <a:buNone/>
+          </a:pPr>
           <a:endParaRPr lang="en-ID" sz="600" kern="1200" dirty="0"/>
         </a:p>
       </dsp:txBody>
       <dsp:txXfrm>
-        <a:off x="6628595" y="2037117"/>
-        <a:ext cx="3306030" cy="626809"/>
+        <a:off x="6019019" y="1766095"/>
+        <a:ext cx="3358731" cy="636801"/>
       </dsp:txXfrm>
     </dsp:sp>
-    <dsp:sp modelId="{C299407E-F259-4A0E-8199-BC35C4758FCB}">
+    <dsp:sp modelId="{81093083-EB62-4CFF-8826-BB4EEB96AA49}">
       <dsp:nvSpPr>
         <dsp:cNvPr id="0" name=""/>
         <dsp:cNvSpPr/>
       </dsp:nvSpPr>
       <dsp:spPr>
         <a:xfrm>
-          <a:off x="3199603" y="3332518"/>
-          <a:ext cx="2775028" cy="846045"/>
+          <a:off x="2668661" y="2904343"/>
+          <a:ext cx="1625052" cy="859532"/>
         </a:xfrm>
         <a:prstGeom prst="rect">
           <a:avLst/>
@@ -5847,12 +6309,12 @@
         </a:fontRef>
       </dsp:style>
       <dsp:txBody>
-        <a:bodyPr spcFirstLastPara="0" vert="horz" wrap="square" lIns="17780" tIns="17780" rIns="17780" bIns="17780" numCol="1" spcCol="1270" anchor="ctr" anchorCtr="0">
+        <a:bodyPr spcFirstLastPara="0" vert="horz" wrap="square" lIns="12700" tIns="12700" rIns="12700" bIns="12700" numCol="1" spcCol="1270" anchor="ctr" anchorCtr="0">
           <a:noAutofit/>
         </a:bodyPr>
         <a:lstStyle/>
         <a:p>
-          <a:pPr marL="0" lvl="0" indent="0" algn="ctr" defTabSz="1244600">
+          <a:pPr marL="0" lvl="0" indent="0" algn="ctr" defTabSz="889000">
             <a:lnSpc>
               <a:spcPct val="90000"/>
             </a:lnSpc>
@@ -5865,18 +6327,201 @@
             <a:buNone/>
           </a:pPr>
           <a:r>
-            <a:rPr lang="en-ID" sz="2800" kern="1200" dirty="0">
+            <a:rPr lang="en-ID" sz="2000" kern="1200" dirty="0">
               <a:solidFill>
                 <a:srgbClr val="50698F"/>
               </a:solidFill>
             </a:rPr>
-            <a:t>Others</a:t>
+            <a:t>Louis Owen</a:t>
+          </a:r>
+          <a:endParaRPr lang="en-ID" sz="2000" kern="1200" dirty="0"/>
+        </a:p>
+      </dsp:txBody>
+      <dsp:txXfrm>
+        <a:off x="2668661" y="2904343"/>
+        <a:ext cx="1625052" cy="859532"/>
+      </dsp:txXfrm>
+    </dsp:sp>
+    <dsp:sp modelId="{20934B84-5653-4BA4-8F3E-5605F1934B82}">
+      <dsp:nvSpPr>
+        <dsp:cNvPr id="0" name=""/>
+        <dsp:cNvSpPr/>
+      </dsp:nvSpPr>
+      <dsp:spPr>
+        <a:xfrm>
+          <a:off x="6029958" y="2904343"/>
+          <a:ext cx="3411395" cy="859532"/>
+        </a:xfrm>
+        <a:prstGeom prst="rect">
+          <a:avLst/>
+        </a:prstGeom>
+        <a:solidFill>
+          <a:srgbClr val="DAE3F3"/>
+        </a:solidFill>
+        <a:ln w="12700" cap="flat" cmpd="sng" algn="ctr">
+          <a:solidFill>
+            <a:schemeClr val="lt1">
+              <a:hueOff val="0"/>
+              <a:satOff val="0"/>
+              <a:lumOff val="0"/>
+              <a:alphaOff val="0"/>
+            </a:schemeClr>
+          </a:solidFill>
+          <a:prstDash val="solid"/>
+          <a:miter lim="800000"/>
+        </a:ln>
+        <a:effectLst/>
+      </dsp:spPr>
+      <dsp:style>
+        <a:lnRef idx="2">
+          <a:scrgbClr r="0" g="0" b="0"/>
+        </a:lnRef>
+        <a:fillRef idx="1">
+          <a:scrgbClr r="0" g="0" b="0"/>
+        </a:fillRef>
+        <a:effectRef idx="0">
+          <a:scrgbClr r="0" g="0" b="0"/>
+        </a:effectRef>
+        <a:fontRef idx="minor">
+          <a:schemeClr val="lt1"/>
+        </a:fontRef>
+      </dsp:style>
+      <dsp:txBody>
+        <a:bodyPr spcFirstLastPara="0" vert="horz" wrap="square" lIns="5715" tIns="5715" rIns="5715" bIns="5715" numCol="1" spcCol="1270" anchor="ctr" anchorCtr="0">
+          <a:noAutofit/>
+        </a:bodyPr>
+        <a:lstStyle/>
+        <a:p>
+          <a:pPr marL="0" lvl="0" indent="0" algn="l" defTabSz="400050">
+            <a:lnSpc>
+              <a:spcPct val="90000"/>
+            </a:lnSpc>
+            <a:spcBef>
+              <a:spcPct val="0"/>
+            </a:spcBef>
+            <a:spcAft>
+              <a:spcPct val="35000"/>
+            </a:spcAft>
+            <a:buNone/>
+          </a:pPr>
+          <a:r>
+            <a:rPr lang="en-ID" sz="900" b="1" kern="1200" dirty="0">
+              <a:solidFill>
+                <a:srgbClr val="0563C1"/>
+              </a:solidFill>
+              <a:hlinkClick xmlns:r="http://schemas.openxmlformats.org/officeDocument/2006/relationships" r:id="rId3"/>
+            </a:rPr>
+            <a:t>https://github.com/louisowen6/NLP_bahasa_resources</a:t>
+          </a:r>
+          <a:endParaRPr lang="en-ID" sz="900" b="1" kern="1200" dirty="0">
+            <a:solidFill>
+              <a:srgbClr val="0563C1"/>
+            </a:solidFill>
+          </a:endParaRPr>
+        </a:p>
+        <a:p>
+          <a:pPr marL="0" lvl="0" indent="0" algn="l" defTabSz="400050">
+            <a:lnSpc>
+              <a:spcPct val="90000"/>
+            </a:lnSpc>
+            <a:spcBef>
+              <a:spcPct val="0"/>
+            </a:spcBef>
+            <a:spcAft>
+              <a:spcPct val="35000"/>
+            </a:spcAft>
+            <a:buNone/>
+          </a:pPr>
+          <a:r>
+            <a:rPr lang="en-ID" sz="900" b="0" kern="1200" dirty="0">
+              <a:solidFill>
+                <a:srgbClr val="0563C1"/>
+              </a:solidFill>
+            </a:rPr>
+            <a:t>- Dataset positive &amp; negative words</a:t>
           </a:r>
         </a:p>
       </dsp:txBody>
       <dsp:txXfrm>
-        <a:off x="3199603" y="3332518"/>
-        <a:ext cx="2775028" cy="846045"/>
+        <a:off x="6029958" y="2904343"/>
+        <a:ext cx="3411395" cy="859532"/>
+      </dsp:txXfrm>
+    </dsp:sp>
+    <dsp:sp modelId="{C299407E-F259-4A0E-8199-BC35C4758FCB}">
+      <dsp:nvSpPr>
+        <dsp:cNvPr id="0" name=""/>
+        <dsp:cNvSpPr/>
+      </dsp:nvSpPr>
+      <dsp:spPr>
+        <a:xfrm>
+          <a:off x="2668661" y="3940626"/>
+          <a:ext cx="1625052" cy="859532"/>
+        </a:xfrm>
+        <a:prstGeom prst="rect">
+          <a:avLst/>
+        </a:prstGeom>
+        <a:solidFill>
+          <a:srgbClr val="D6D4D7"/>
+        </a:solidFill>
+        <a:ln w="12700" cap="flat" cmpd="sng" algn="ctr">
+          <a:solidFill>
+            <a:schemeClr val="lt1">
+              <a:hueOff val="0"/>
+              <a:satOff val="0"/>
+              <a:lumOff val="0"/>
+              <a:alphaOff val="0"/>
+            </a:schemeClr>
+          </a:solidFill>
+          <a:prstDash val="solid"/>
+          <a:miter lim="800000"/>
+        </a:ln>
+        <a:effectLst/>
+      </dsp:spPr>
+      <dsp:style>
+        <a:lnRef idx="2">
+          <a:scrgbClr r="0" g="0" b="0"/>
+        </a:lnRef>
+        <a:fillRef idx="1">
+          <a:scrgbClr r="0" g="0" b="0"/>
+        </a:fillRef>
+        <a:effectRef idx="0">
+          <a:scrgbClr r="0" g="0" b="0"/>
+        </a:effectRef>
+        <a:fontRef idx="minor">
+          <a:schemeClr val="lt1"/>
+        </a:fontRef>
+      </dsp:style>
+      <dsp:txBody>
+        <a:bodyPr spcFirstLastPara="0" vert="horz" wrap="square" lIns="12700" tIns="12700" rIns="12700" bIns="12700" numCol="1" spcCol="1270" anchor="ctr" anchorCtr="0">
+          <a:noAutofit/>
+        </a:bodyPr>
+        <a:lstStyle/>
+        <a:p>
+          <a:pPr marL="0" lvl="0" indent="0" algn="ctr" defTabSz="889000">
+            <a:lnSpc>
+              <a:spcPct val="90000"/>
+            </a:lnSpc>
+            <a:spcBef>
+              <a:spcPct val="0"/>
+            </a:spcBef>
+            <a:spcAft>
+              <a:spcPct val="35000"/>
+            </a:spcAft>
+            <a:buNone/>
+          </a:pPr>
+          <a:r>
+            <a:rPr lang="en-ID" sz="2000" kern="1200" dirty="0">
+              <a:solidFill>
+                <a:srgbClr val="50698F"/>
+              </a:solidFill>
+            </a:rPr>
+            <a:t>Research Gate</a:t>
+          </a:r>
+        </a:p>
+      </dsp:txBody>
+      <dsp:txXfrm>
+        <a:off x="2668661" y="3940626"/>
+        <a:ext cx="1625052" cy="859532"/>
       </dsp:txXfrm>
     </dsp:sp>
     <dsp:sp modelId="{631DD2BD-E610-4DBC-B2AF-9692B85C6E47}">
@@ -5886,8 +6531,8 @@
       </dsp:nvSpPr>
       <dsp:spPr>
         <a:xfrm>
-          <a:off x="6628595" y="3517553"/>
-          <a:ext cx="3345324" cy="464284"/>
+          <a:off x="6049355" y="3975896"/>
+          <a:ext cx="3398652" cy="787572"/>
         </a:xfrm>
         <a:prstGeom prst="rect">
           <a:avLst/>
@@ -5950,15 +6595,88 @@
               <a:solidFill>
                 <a:srgbClr val="003781"/>
               </a:solidFill>
+              <a:hlinkClick xmlns:r="http://schemas.openxmlformats.org/officeDocument/2006/relationships" r:id="rId4"/>
             </a:rPr>
-            <a:t>Meltwater</a:t>
+            <a:t>https://www.researchgate.net/publication/339936724_Indonesian_Sentiment_Twitter_Dataset</a:t>
           </a:r>
-          <a:endParaRPr lang="en-ID" sz="900" kern="1200" dirty="0"/>
+          <a:endParaRPr lang="en-ID" sz="900" b="1" kern="1200" dirty="0">
+            <a:solidFill>
+              <a:srgbClr val="003781"/>
+            </a:solidFill>
+          </a:endParaRPr>
+        </a:p>
+        <a:p>
+          <a:pPr marL="0" lvl="0" indent="0" algn="l" defTabSz="400050">
+            <a:lnSpc>
+              <a:spcPct val="90000"/>
+            </a:lnSpc>
+            <a:spcBef>
+              <a:spcPct val="0"/>
+            </a:spcBef>
+            <a:spcAft>
+              <a:spcPct val="35000"/>
+            </a:spcAft>
+            <a:buFont typeface="+mj-lt"/>
+            <a:buNone/>
+          </a:pPr>
+          <a:r>
+            <a:rPr lang="en-ID" sz="900" b="0" kern="1200" dirty="0">
+              <a:solidFill>
+                <a:srgbClr val="003781"/>
+              </a:solidFill>
+            </a:rPr>
+            <a:t>- </a:t>
+          </a:r>
+          <a:r>
+            <a:rPr lang="en-ID" sz="900" b="0" kern="1200" dirty="0" err="1">
+              <a:solidFill>
+                <a:srgbClr val="003781"/>
+              </a:solidFill>
+            </a:rPr>
+            <a:t>Indonesian_Sentiment_Twitter_Dataset_Labeled</a:t>
+          </a:r>
+          <a:endParaRPr lang="en-ID" sz="900" b="0" kern="1200" dirty="0">
+            <a:solidFill>
+              <a:srgbClr val="003781"/>
+            </a:solidFill>
+          </a:endParaRPr>
+        </a:p>
+        <a:p>
+          <a:pPr marL="0" lvl="0" indent="0" algn="l" defTabSz="400050">
+            <a:lnSpc>
+              <a:spcPct val="90000"/>
+            </a:lnSpc>
+            <a:spcBef>
+              <a:spcPct val="0"/>
+            </a:spcBef>
+            <a:spcAft>
+              <a:spcPct val="35000"/>
+            </a:spcAft>
+            <a:buFont typeface="+mj-lt"/>
+            <a:buNone/>
+          </a:pPr>
+          <a:r>
+            <a:rPr lang="en-ID" sz="900" b="0" kern="1200" dirty="0">
+              <a:solidFill>
+                <a:srgbClr val="003781"/>
+              </a:solidFill>
+            </a:rPr>
+            <a:t>- </a:t>
+          </a:r>
+          <a:r>
+            <a:rPr lang="en-ID" sz="900" b="0" kern="1200" dirty="0" err="1">
+              <a:solidFill>
+                <a:srgbClr val="003781"/>
+              </a:solidFill>
+            </a:rPr>
+            <a:t>Indonesian_Sentiment_Twitter_Dataset_Unlabeled</a:t>
+          </a:r>
+          <a:endParaRPr lang="en-ID" sz="900" b="0" kern="1200" dirty="0"/>
         </a:p>
       </dsp:txBody>
       <dsp:txXfrm>
-        <a:off x="6628595" y="3517553"/>
-        <a:ext cx="3345324" cy="464284"/>
+        <a:off x="6049355" y="3975896"/>
+        <a:ext cx="3398652" cy="787572"/>
       </dsp:txXfrm>
     </dsp:sp>
   </dsp:spTree>
@@ -11387,7 +12105,7 @@
           <a:p>
             <a:fld id="{A64D9B6F-F621-4A62-84F4-5FFAE9A4C545}" type="datetimeFigureOut">
               <a:rPr lang="en-GB" smtClean="0"/>
-              <a:t>06/03/2021</a:t>
+              <a:t>07/03/2021</a:t>
             </a:fld>
             <a:endParaRPr lang="en-GB"/>
           </a:p>
@@ -11552,7 +12270,7 @@
           <a:p>
             <a:fld id="{7D789E00-45B7-44B8-8E59-84DE0BD71A0D}" type="datetimeFigureOut">
               <a:rPr lang="de-DE" smtClean="0"/>
-              <a:t>06.03.2021</a:t>
+              <a:t>07.03.2021</a:t>
             </a:fld>
             <a:endParaRPr lang="de-DE"/>
           </a:p>
@@ -12052,7 +12770,7 @@
           <a:p>
             <a:fld id="{1153D9D2-4109-4658-A169-3AF16B615417}" type="datetime5">
               <a:rPr lang="en-US" smtClean="0"/>
-              <a:t>6-Mar-21</a:t>
+              <a:t>7-Mar-21</a:t>
             </a:fld>
             <a:endParaRPr lang="en-GB"/>
           </a:p>
@@ -12258,7 +12976,7 @@
           <a:p>
             <a:fld id="{1153D9D2-4109-4658-A169-3AF16B615417}" type="datetime5">
               <a:rPr lang="en-US" smtClean="0"/>
-              <a:t>6-Mar-21</a:t>
+              <a:t>7-Mar-21</a:t>
             </a:fld>
             <a:endParaRPr lang="en-GB"/>
           </a:p>
@@ -12474,7 +13192,7 @@
           <a:p>
             <a:fld id="{1153D9D2-4109-4658-A169-3AF16B615417}" type="datetime5">
               <a:rPr lang="en-US" smtClean="0"/>
-              <a:t>6-Mar-21</a:t>
+              <a:t>7-Mar-21</a:t>
             </a:fld>
             <a:endParaRPr lang="en-GB"/>
           </a:p>
@@ -12984,7 +13702,7 @@
           <a:p>
             <a:fld id="{1153D9D2-4109-4658-A169-3AF16B615417}" type="datetime5">
               <a:rPr lang="en-US" smtClean="0"/>
-              <a:t>6-Mar-21</a:t>
+              <a:t>7-Mar-21</a:t>
             </a:fld>
             <a:endParaRPr lang="en-GB"/>
           </a:p>
@@ -13177,7 +13895,7 @@
           <a:p>
             <a:fld id="{1153D9D2-4109-4658-A169-3AF16B615417}" type="datetime5">
               <a:rPr lang="en-US" smtClean="0"/>
-              <a:t>6-Mar-21</a:t>
+              <a:t>7-Mar-21</a:t>
             </a:fld>
             <a:endParaRPr lang="en-GB"/>
           </a:p>
@@ -13459,7 +14177,7 @@
           <a:p>
             <a:fld id="{1153D9D2-4109-4658-A169-3AF16B615417}" type="datetime5">
               <a:rPr lang="en-US" smtClean="0"/>
-              <a:t>6-Mar-21</a:t>
+              <a:t>7-Mar-21</a:t>
             </a:fld>
             <a:endParaRPr lang="en-GB"/>
           </a:p>
@@ -13733,7 +14451,7 @@
           <a:p>
             <a:fld id="{1153D9D2-4109-4658-A169-3AF16B615417}" type="datetime5">
               <a:rPr lang="en-US" smtClean="0"/>
-              <a:t>6-Mar-21</a:t>
+              <a:t>7-Mar-21</a:t>
             </a:fld>
             <a:endParaRPr lang="en-GB"/>
           </a:p>
@@ -14154,7 +14872,7 @@
           <a:p>
             <a:fld id="{1153D9D2-4109-4658-A169-3AF16B615417}" type="datetime5">
               <a:rPr lang="en-US" smtClean="0"/>
-              <a:t>6-Mar-21</a:t>
+              <a:t>7-Mar-21</a:t>
             </a:fld>
             <a:endParaRPr lang="en-GB"/>
           </a:p>
@@ -14302,7 +15020,7 @@
           <a:p>
             <a:fld id="{1153D9D2-4109-4658-A169-3AF16B615417}" type="datetime5">
               <a:rPr lang="en-US" smtClean="0"/>
-              <a:t>6-Mar-21</a:t>
+              <a:t>7-Mar-21</a:t>
             </a:fld>
             <a:endParaRPr lang="en-GB"/>
           </a:p>
@@ -14421,7 +15139,7 @@
           <a:p>
             <a:fld id="{1153D9D2-4109-4658-A169-3AF16B615417}" type="datetime5">
               <a:rPr lang="en-US" smtClean="0"/>
-              <a:t>6-Mar-21</a:t>
+              <a:t>7-Mar-21</a:t>
             </a:fld>
             <a:endParaRPr lang="en-GB"/>
           </a:p>
@@ -14740,7 +15458,7 @@
           <a:p>
             <a:fld id="{1153D9D2-4109-4658-A169-3AF16B615417}" type="datetime5">
               <a:rPr lang="en-US" smtClean="0"/>
-              <a:t>6-Mar-21</a:t>
+              <a:t>7-Mar-21</a:t>
             </a:fld>
             <a:endParaRPr lang="en-GB"/>
           </a:p>
@@ -15035,7 +15753,7 @@
           <a:p>
             <a:fld id="{1153D9D2-4109-4658-A169-3AF16B615417}" type="datetime5">
               <a:rPr lang="en-US" smtClean="0"/>
-              <a:t>6-Mar-21</a:t>
+              <a:t>7-Mar-21</a:t>
             </a:fld>
             <a:endParaRPr lang="en-GB"/>
           </a:p>
@@ -15284,7 +16002,7 @@
           <a:p>
             <a:fld id="{1153D9D2-4109-4658-A169-3AF16B615417}" type="datetime5">
               <a:rPr lang="en-US" smtClean="0"/>
-              <a:t>6-Mar-21</a:t>
+              <a:t>7-Mar-21</a:t>
             </a:fld>
             <a:endParaRPr lang="en-GB"/>
           </a:p>
@@ -16033,7 +16751,7 @@
           <a:p>
             <a:fld id="{1153D9D2-4109-4658-A169-3AF16B615417}" type="datetime5">
               <a:rPr lang="en-US" smtClean="0"/>
-              <a:t>6-Mar-21</a:t>
+              <a:t>7-Mar-21</a:t>
             </a:fld>
             <a:endParaRPr lang="en-GB"/>
           </a:p>
@@ -16205,7 +16923,7 @@
           <a:p>
             <a:fld id="{1153D9D2-4109-4658-A169-3AF16B615417}" type="datetime5">
               <a:rPr lang="en-US" smtClean="0"/>
-              <a:t>6-Mar-21</a:t>
+              <a:t>7-Mar-21</a:t>
             </a:fld>
             <a:endParaRPr lang="en-GB" dirty="0"/>
           </a:p>
@@ -16644,7 +17362,7 @@
         </p:nvSpPr>
         <p:spPr>
           <a:xfrm>
-            <a:off x="507934" y="4781203"/>
+            <a:off x="507934" y="4956046"/>
             <a:ext cx="856456" cy="916395"/>
           </a:xfrm>
           <a:prstGeom prst="rect">
@@ -16703,7 +17421,7 @@
         </p:nvSpPr>
         <p:spPr>
           <a:xfrm>
-            <a:off x="1447006" y="4778951"/>
+            <a:off x="1447006" y="4953794"/>
             <a:ext cx="10591800" cy="904160"/>
           </a:xfrm>
           <a:prstGeom prst="rect">
@@ -16808,7 +17526,7 @@
         <p:spPr>
           <a:xfrm>
             <a:off x="507934" y="4240766"/>
-            <a:ext cx="856456" cy="470520"/>
+            <a:ext cx="856456" cy="636828"/>
           </a:xfrm>
           <a:prstGeom prst="rect">
             <a:avLst/>
@@ -16867,7 +17585,7 @@
         <p:spPr>
           <a:xfrm>
             <a:off x="1447006" y="4238513"/>
-            <a:ext cx="10591800" cy="464238"/>
+            <a:ext cx="10591800" cy="628326"/>
           </a:xfrm>
           <a:prstGeom prst="rect">
             <a:avLst/>
@@ -17004,7 +17722,10 @@
           <a:bodyPr/>
           <a:lstStyle/>
           <a:p>
-            <a:endParaRPr lang="en-ID"/>
+            <a:r>
+              <a:rPr lang="en-ID" b="1" dirty="0"/>
+              <a:t>ABOUT ONLINE SENTIMENT DETECTOR</a:t>
+            </a:r>
           </a:p>
         </p:txBody>
       </p:sp>
@@ -17058,7 +17779,7 @@
           <a:p>
             <a:fld id="{1153D9D2-4109-4658-A169-3AF16B615417}" type="datetime5">
               <a:rPr lang="en-US" smtClean="0"/>
-              <a:t>6-Mar-21</a:t>
+              <a:t>7-Mar-21</a:t>
             </a:fld>
             <a:endParaRPr lang="en-GB"/>
           </a:p>
@@ -17513,7 +18234,7 @@
           <a:p>
             <a:r>
               <a:rPr lang="en-ID" b="1" dirty="0"/>
-              <a:t>PROTOTYPE</a:t>
+              <a:t>DASHBOARD PROTOTYPE</a:t>
             </a:r>
           </a:p>
         </p:txBody>
@@ -17568,7 +18289,7 @@
           <a:p>
             <a:fld id="{1153D9D2-4109-4658-A169-3AF16B615417}" type="datetime5">
               <a:rPr lang="en-US" smtClean="0"/>
-              <a:t>6-Mar-21</a:t>
+              <a:t>7-Mar-21</a:t>
             </a:fld>
             <a:endParaRPr lang="en-GB" dirty="0"/>
           </a:p>
@@ -17604,46 +18325,6 @@
           </a:p>
         </p:txBody>
       </p:sp>
-      <p:pic>
-        <p:nvPicPr>
-          <p:cNvPr id="9" name="Picture 8">
-            <a:extLst>
-              <a:ext uri="{FF2B5EF4-FFF2-40B4-BE49-F238E27FC236}">
-                <a16:creationId xmlns:a16="http://schemas.microsoft.com/office/drawing/2014/main" id="{72B2CB2E-B558-4F9B-AEFA-C9598C43B666}"/>
-              </a:ext>
-            </a:extLst>
-          </p:cNvPr>
-          <p:cNvPicPr>
-            <a:picLocks noChangeAspect="1"/>
-          </p:cNvPicPr>
-          <p:nvPr/>
-        </p:nvPicPr>
-        <p:blipFill>
-          <a:blip r:embed="rId2"/>
-          <a:stretch>
-            <a:fillRect/>
-          </a:stretch>
-        </p:blipFill>
-        <p:spPr>
-          <a:xfrm>
-            <a:off x="913606" y="3064051"/>
-            <a:ext cx="3047999" cy="1009298"/>
-          </a:xfrm>
-          <a:prstGeom prst="rect">
-            <a:avLst/>
-          </a:prstGeom>
-          <a:ln>
-            <a:noFill/>
-          </a:ln>
-          <a:effectLst>
-            <a:outerShdw blurRad="292100" dist="139700" dir="2700000" algn="tl" rotWithShape="0">
-              <a:srgbClr val="333333">
-                <a:alpha val="65000"/>
-              </a:srgbClr>
-            </a:outerShdw>
-          </a:effectLst>
-        </p:spPr>
-      </p:pic>
       <p:grpSp>
         <p:nvGrpSpPr>
           <p:cNvPr id="25" name="Group 24">
@@ -17658,8 +18339,8 @@
         </p:nvGrpSpPr>
         <p:grpSpPr>
           <a:xfrm>
-            <a:off x="5409406" y="630057"/>
-            <a:ext cx="5929277" cy="3686804"/>
+            <a:off x="1751806" y="1028700"/>
+            <a:ext cx="8839200" cy="5496184"/>
             <a:chOff x="4324844" y="760369"/>
             <a:chExt cx="5929277" cy="3686804"/>
           </a:xfrm>
@@ -17699,7 +18380,7 @@
               <p:nvPr/>
             </p:nvPicPr>
             <p:blipFill>
-              <a:blip r:embed="rId3"/>
+              <a:blip r:embed="rId2"/>
               <a:stretch>
                 <a:fillRect/>
               </a:stretch>
@@ -17739,7 +18420,7 @@
               <p:nvPr/>
             </p:nvPicPr>
             <p:blipFill>
-              <a:blip r:embed="rId4"/>
+              <a:blip r:embed="rId3"/>
               <a:stretch>
                 <a:fillRect/>
               </a:stretch>
@@ -17779,7 +18460,7 @@
               <p:nvPr/>
             </p:nvPicPr>
             <p:blipFill>
-              <a:blip r:embed="rId5"/>
+              <a:blip r:embed="rId4"/>
               <a:stretch>
                 <a:fillRect/>
               </a:stretch>
@@ -17819,7 +18500,7 @@
               <p:nvPr/>
             </p:nvPicPr>
             <p:blipFill>
-              <a:blip r:embed="rId6"/>
+              <a:blip r:embed="rId5"/>
               <a:stretch>
                 <a:fillRect/>
               </a:stretch>
@@ -17987,214 +18668,6 @@
           </p:txBody>
         </p:sp>
       </p:grpSp>
-      <p:grpSp>
-        <p:nvGrpSpPr>
-          <p:cNvPr id="24" name="Group 23">
-            <a:extLst>
-              <a:ext uri="{FF2B5EF4-FFF2-40B4-BE49-F238E27FC236}">
-                <a16:creationId xmlns:a16="http://schemas.microsoft.com/office/drawing/2014/main" id="{096A220B-2C2E-4F1A-8A1C-A8E5763CB184}"/>
-              </a:ext>
-            </a:extLst>
-          </p:cNvPr>
-          <p:cNvGrpSpPr/>
-          <p:nvPr/>
-        </p:nvGrpSpPr>
-        <p:grpSpPr>
-          <a:xfrm>
-            <a:off x="5373846" y="4856849"/>
-            <a:ext cx="3429000" cy="1650495"/>
-            <a:chOff x="4329131" y="5146535"/>
-            <a:chExt cx="3429000" cy="1650495"/>
-          </a:xfrm>
-        </p:grpSpPr>
-        <p:pic>
-          <p:nvPicPr>
-            <p:cNvPr id="13" name="Picture 12">
-              <a:extLst>
-                <a:ext uri="{FF2B5EF4-FFF2-40B4-BE49-F238E27FC236}">
-                  <a16:creationId xmlns:a16="http://schemas.microsoft.com/office/drawing/2014/main" id="{25E93D5E-6BD5-45F3-9D03-434A98C7AA7D}"/>
-                </a:ext>
-              </a:extLst>
-            </p:cNvPr>
-            <p:cNvPicPr>
-              <a:picLocks noChangeAspect="1"/>
-            </p:cNvPicPr>
-            <p:nvPr/>
-          </p:nvPicPr>
-          <p:blipFill>
-            <a:blip r:embed="rId7"/>
-            <a:stretch>
-              <a:fillRect/>
-            </a:stretch>
-          </p:blipFill>
-          <p:spPr>
-            <a:xfrm>
-              <a:off x="4329131" y="5597951"/>
-              <a:ext cx="3429000" cy="1199079"/>
-            </a:xfrm>
-            <a:prstGeom prst="rect">
-              <a:avLst/>
-            </a:prstGeom>
-            <a:ln>
-              <a:noFill/>
-            </a:ln>
-            <a:effectLst>
-              <a:outerShdw blurRad="292100" dist="139700" dir="2700000" algn="tl" rotWithShape="0">
-                <a:srgbClr val="333333">
-                  <a:alpha val="65000"/>
-                </a:srgbClr>
-              </a:outerShdw>
-            </a:effectLst>
-          </p:spPr>
-        </p:pic>
-        <p:sp>
-          <p:nvSpPr>
-            <p:cNvPr id="23" name="Rectangle 22">
-              <a:extLst>
-                <a:ext uri="{FF2B5EF4-FFF2-40B4-BE49-F238E27FC236}">
-                  <a16:creationId xmlns:a16="http://schemas.microsoft.com/office/drawing/2014/main" id="{D6F2CFAC-1ABA-4220-AE1C-6786062F8656}"/>
-                </a:ext>
-              </a:extLst>
-            </p:cNvPr>
-            <p:cNvSpPr/>
-            <p:nvPr/>
-          </p:nvSpPr>
-          <p:spPr>
-            <a:xfrm>
-              <a:off x="4329131" y="5146535"/>
-              <a:ext cx="3429000" cy="451416"/>
-            </a:xfrm>
-            <a:prstGeom prst="rect">
-              <a:avLst/>
-            </a:prstGeom>
-            <a:ln/>
-          </p:spPr>
-          <p:style>
-            <a:lnRef idx="2">
-              <a:schemeClr val="accent2"/>
-            </a:lnRef>
-            <a:fillRef idx="1">
-              <a:schemeClr val="lt1"/>
-            </a:fillRef>
-            <a:effectRef idx="0">
-              <a:schemeClr val="accent2"/>
-            </a:effectRef>
-            <a:fontRef idx="minor">
-              <a:schemeClr val="dk1"/>
-            </a:fontRef>
-          </p:style>
-          <p:txBody>
-            <a:bodyPr rot="0" spcFirstLastPara="0" vertOverflow="overflow" horzOverflow="overflow" vert="horz" wrap="square" lIns="108000" tIns="108000" rIns="108000" bIns="108000" numCol="1" spcCol="0" rtlCol="0" fromWordArt="0" anchor="t" anchorCtr="0" forceAA="0" compatLnSpc="1">
-              <a:prstTxWarp prst="textNoShape">
-                <a:avLst/>
-              </a:prstTxWarp>
-              <a:noAutofit/>
-            </a:bodyPr>
-            <a:lstStyle/>
-            <a:p>
-              <a:pPr algn="ctr">
-                <a:spcBef>
-                  <a:spcPts val="100"/>
-                </a:spcBef>
-                <a:spcAft>
-                  <a:spcPts val="100"/>
-                </a:spcAft>
-              </a:pPr>
-              <a:r>
-                <a:rPr lang="en-US" sz="1400" dirty="0"/>
-                <a:t>Text Sentiment Checker</a:t>
-              </a:r>
-              <a:endParaRPr lang="en-ID" sz="1400" dirty="0"/>
-            </a:p>
-          </p:txBody>
-        </p:sp>
-      </p:grpSp>
-      <p:cxnSp>
-        <p:nvCxnSpPr>
-          <p:cNvPr id="27" name="Straight Arrow Connector 26">
-            <a:extLst>
-              <a:ext uri="{FF2B5EF4-FFF2-40B4-BE49-F238E27FC236}">
-                <a16:creationId xmlns:a16="http://schemas.microsoft.com/office/drawing/2014/main" id="{129FEB44-55D0-4E2E-9E2B-D464A57FC112}"/>
-              </a:ext>
-            </a:extLst>
-          </p:cNvPr>
-          <p:cNvCxnSpPr>
-            <a:cxnSpLocks/>
-            <a:stCxn id="9" idx="3"/>
-            <a:endCxn id="11" idx="1"/>
-          </p:cNvCxnSpPr>
-          <p:nvPr/>
-        </p:nvCxnSpPr>
-        <p:spPr>
-          <a:xfrm flipV="1">
-            <a:off x="3961605" y="2128185"/>
-            <a:ext cx="1447802" cy="1440515"/>
-          </a:xfrm>
-          <a:prstGeom prst="straightConnector1">
-            <a:avLst/>
-          </a:prstGeom>
-          <a:ln w="28575">
-            <a:tailEnd type="triangle"/>
-          </a:ln>
-        </p:spPr>
-        <p:style>
-          <a:lnRef idx="1">
-            <a:schemeClr val="accent1"/>
-          </a:lnRef>
-          <a:fillRef idx="0">
-            <a:schemeClr val="accent1"/>
-          </a:fillRef>
-          <a:effectRef idx="0">
-            <a:schemeClr val="accent1"/>
-          </a:effectRef>
-          <a:fontRef idx="minor">
-            <a:schemeClr val="tx1"/>
-          </a:fontRef>
-        </p:style>
-      </p:cxnSp>
-      <p:cxnSp>
-        <p:nvCxnSpPr>
-          <p:cNvPr id="28" name="Straight Arrow Connector 27">
-            <a:extLst>
-              <a:ext uri="{FF2B5EF4-FFF2-40B4-BE49-F238E27FC236}">
-                <a16:creationId xmlns:a16="http://schemas.microsoft.com/office/drawing/2014/main" id="{3B9D5435-D0B8-4C0E-B922-F82791A2887C}"/>
-              </a:ext>
-            </a:extLst>
-          </p:cNvPr>
-          <p:cNvCxnSpPr>
-            <a:cxnSpLocks/>
-            <a:stCxn id="9" idx="3"/>
-            <a:endCxn id="13" idx="1"/>
-          </p:cNvCxnSpPr>
-          <p:nvPr/>
-        </p:nvCxnSpPr>
-        <p:spPr>
-          <a:xfrm>
-            <a:off x="3961605" y="3568700"/>
-            <a:ext cx="1412241" cy="2339105"/>
-          </a:xfrm>
-          <a:prstGeom prst="straightConnector1">
-            <a:avLst/>
-          </a:prstGeom>
-          <a:ln w="28575">
-            <a:tailEnd type="triangle"/>
-          </a:ln>
-        </p:spPr>
-        <p:style>
-          <a:lnRef idx="1">
-            <a:schemeClr val="accent1"/>
-          </a:lnRef>
-          <a:fillRef idx="0">
-            <a:schemeClr val="accent1"/>
-          </a:fillRef>
-          <a:effectRef idx="0">
-            <a:schemeClr val="accent1"/>
-          </a:effectRef>
-          <a:fontRef idx="minor">
-            <a:schemeClr val="tx1"/>
-          </a:fontRef>
-        </p:style>
-      </p:cxnSp>
     </p:spTree>
     <p:extLst>
       <p:ext uri="{BB962C8B-B14F-4D97-AF65-F5344CB8AC3E}">
@@ -18328,7 +18801,7 @@
           <a:p>
             <a:fld id="{1153D9D2-4109-4658-A169-3AF16B615417}" type="datetime5">
               <a:rPr lang="en-US" smtClean="0"/>
-              <a:t>6-Mar-21</a:t>
+              <a:t>7-Mar-21</a:t>
             </a:fld>
             <a:endParaRPr lang="en-GB"/>
           </a:p>
@@ -18377,14 +18850,14 @@
           <p:nvPr>
             <p:extLst>
               <p:ext uri="{D42A27DB-BD31-4B8C-83A1-F6EECF244321}">
-                <p14:modId xmlns:p14="http://schemas.microsoft.com/office/powerpoint/2010/main" val="3384063016"/>
+                <p14:modId xmlns:p14="http://schemas.microsoft.com/office/powerpoint/2010/main" val="2868787619"/>
               </p:ext>
             </p:extLst>
           </p:nvPr>
         </p:nvGraphicFramePr>
         <p:xfrm>
-          <a:off x="0" y="1468879"/>
-          <a:ext cx="11581606" cy="4461580"/>
+          <a:off x="0" y="1130300"/>
+          <a:ext cx="11581606" cy="4800159"/>
         </p:xfrm>
         <a:graphic>
           <a:graphicData uri="http://schemas.openxmlformats.org/drawingml/2006/diagram">
@@ -18525,7 +18998,7 @@
           <a:p>
             <a:fld id="{1153D9D2-4109-4658-A169-3AF16B615417}" type="datetime5">
               <a:rPr lang="en-US" smtClean="0"/>
-              <a:t>6-Mar-21</a:t>
+              <a:t>7-Mar-21</a:t>
             </a:fld>
             <a:endParaRPr lang="en-GB"/>
           </a:p>
@@ -19541,7 +20014,7 @@
           <a:p>
             <a:fld id="{1153D9D2-4109-4658-A169-3AF16B615417}" type="datetime5">
               <a:rPr lang="en-US" smtClean="0"/>
-              <a:t>6-Mar-21</a:t>
+              <a:t>7-Mar-21</a:t>
             </a:fld>
             <a:endParaRPr lang="en-GB"/>
           </a:p>
@@ -19885,7 +20358,7 @@
           <a:p>
             <a:fld id="{1153D9D2-4109-4658-A169-3AF16B615417}" type="datetime5">
               <a:rPr lang="en-US" smtClean="0"/>
-              <a:t>6-Mar-21</a:t>
+              <a:t>7-Mar-21</a:t>
             </a:fld>
             <a:endParaRPr lang="en-GB"/>
           </a:p>

</xml_diff>